<commit_message>
sketch 3rd prototype for when I get a chance to work on it again
</commit_message>
<xml_diff>
--- a/presentation3/newt-p3.pptx
+++ b/presentation3/newt-p3.pptx
@@ -32,6 +32,10 @@
     <p:sldId id="280" r:id="rId26"/>
     <p:sldId id="281" r:id="rId27"/>
     <p:sldId id="282" r:id="rId28"/>
+    <p:sldId id="283" r:id="rId29"/>
+    <p:sldId id="284" r:id="rId30"/>
+    <p:sldId id="285" r:id="rId31"/>
+    <p:sldId id="286" r:id="rId32"/>
   </p:sldIdLst>
   <p:sldSz cx="9144000" cy="5143500" type="screen16x9"/>
   <p:notesSz cx="6858000" cy="9144000"/>
@@ -3226,7 +3230,7 @@
             </a:pPr>
             <a:r>
               <a:rPr/>
-              <a:t>Assemble app from YAML (less coding)</a:t>
+              <a:t>Stack changes</a:t>
             </a:r>
           </a:p>
         </p:txBody>
@@ -3249,21 +3253,14 @@
             <a:pPr lvl="0"/>
             <a:r>
               <a:rPr/>
-              <a:t>The application you want is described in YAML</a:t>
-            </a:r>
-          </a:p>
-          <a:p>
-            <a:pPr lvl="0"/>
-            <a:r>
-              <a:rPr/>
-              <a:t>Newt generates the code you need</a:t>
-            </a:r>
-          </a:p>
-          <a:p>
-            <a:pPr lvl="0"/>
-            <a:r>
-              <a:rPr/>
-              <a:t>Customize by editing the generated code</a:t>
+              <a:t>render JSON responses via HandlebarJS template engine</a:t>
+            </a:r>
+          </a:p>
+          <a:p>
+            <a:pPr lvl="0"/>
+            <a:r>
+              <a:rPr/>
+              <a:t>generated validation code via TypeScript running in Deno</a:t>
             </a:r>
           </a:p>
         </p:txBody>
@@ -3310,7 +3307,7 @@
             </a:pPr>
             <a:r>
               <a:rPr/>
-              <a:t>How are data models described?</a:t>
+              <a:t>Off the shelf (no coding)</a:t>
             </a:r>
           </a:p>
         </p:txBody>
@@ -3333,21 +3330,72 @@
             <a:pPr lvl="0"/>
             <a:r>
               <a:rPr/>
-              <a:t>A model is a set of HTML form input types</a:t>
-            </a:r>
-          </a:p>
-          <a:p>
-            <a:pPr lvl="0"/>
-            <a:r>
-              <a:rPr/>
-              <a:t>Expressed using GitHub YAML Issue Template Syntax</a:t>
-            </a:r>
-          </a:p>
-          <a:p>
-            <a:pPr lvl="0"/>
-            <a:r>
-              <a:rPr/>
-              <a:t>Model describes HTML and implies SQL</a:t>
+              <a:t>Data Sources</a:t>
+            </a:r>
+          </a:p>
+          <a:p>
+            <a:pPr lvl="1"/>
+            <a:r>
+              <a:rPr>
+                <a:hlinkClick r:id="rId2"/>
+              </a:rPr>
+              <a:t>Dataset + datasetd</a:t>
+            </a:r>
+          </a:p>
+          <a:p>
+            <a:pPr lvl="1"/>
+            <a:r>
+              <a:rPr>
+                <a:hlinkClick r:id="rId3"/>
+              </a:rPr>
+              <a:t>Postgres</a:t>
+            </a:r>
+            <a:r>
+              <a:rPr/>
+              <a:t> + </a:t>
+            </a:r>
+            <a:r>
+              <a:rPr>
+                <a:hlinkClick r:id="rId4"/>
+              </a:rPr>
+              <a:t>PostgREST</a:t>
+            </a:r>
+          </a:p>
+          <a:p>
+            <a:pPr lvl="1"/>
+            <a:r>
+              <a:rPr>
+                <a:hlinkClick r:id="rId5"/>
+              </a:rPr>
+              <a:t>Solr</a:t>
+            </a:r>
+            <a:r>
+              <a:rPr/>
+              <a:t> ??? </a:t>
+            </a:r>
+            <a:r>
+              <a:rPr>
+                <a:hlinkClick r:id="rId6"/>
+              </a:rPr>
+              <a:t>OpenSearch</a:t>
+            </a:r>
+            <a:r>
+              <a:rPr/>
+              <a:t> ???</a:t>
+            </a:r>
+          </a:p>
+          <a:p>
+            <a:pPr lvl="0"/>
+            <a:r>
+              <a:rPr/>
+              <a:t>Newt Handlebars =&gt; Transform JSON into web pages</a:t>
+            </a:r>
+          </a:p>
+          <a:p>
+            <a:pPr lvl="0"/>
+            <a:r>
+              <a:rPr/>
+              <a:t>Newt Router, ties it all together</a:t>
             </a:r>
           </a:p>
         </p:txBody>
@@ -3394,7 +3442,7 @@
             </a:pPr>
             <a:r>
               <a:rPr/>
-              <a:t>How do I think things will work?</a:t>
+              <a:t>Assemble app from YAML (less coding)</a:t>
             </a:r>
           </a:p>
         </p:txBody>
@@ -3414,48 +3462,31 @@
           <a:bodyPr/>
           <a:lstStyle/>
           <a:p>
-            <a:pPr lvl="0" indent="-342900" marL="342900">
-              <a:buAutoNum type="arabicPeriod"/>
-            </a:pPr>
-            <a:r>
-              <a:rPr/>
-              <a:t>Interactively generate our application’s YAML file</a:t>
-            </a:r>
-          </a:p>
-          <a:p>
-            <a:pPr lvl="0" indent="-342900" marL="342900">
-              <a:buAutoNum type="arabicPeriod"/>
-            </a:pPr>
-            <a:r>
-              <a:rPr/>
-              <a:t>Interactively define data models</a:t>
-            </a:r>
-          </a:p>
-          <a:p>
-            <a:pPr lvl="0" indent="-342900" marL="342900">
-              <a:buAutoNum type="arabicPeriod"/>
-            </a:pPr>
-            <a:r>
-              <a:rPr/>
-              <a:t>Generate our application code</a:t>
-            </a:r>
-          </a:p>
-          <a:p>
-            <a:pPr lvl="0" indent="-342900" marL="342900">
-              <a:buAutoNum type="arabicPeriod"/>
-            </a:pPr>
-            <a:r>
-              <a:rPr/>
-              <a:t>Setup Postgres and PostgREST</a:t>
-            </a:r>
-          </a:p>
-          <a:p>
-            <a:pPr lvl="0" indent="-342900" marL="342900">
-              <a:buAutoNum type="arabicPeriod"/>
-            </a:pPr>
-            <a:r>
-              <a:rPr/>
-              <a:t>Run our app with Newt</a:t>
+            <a:pPr lvl="0"/>
+            <a:r>
+              <a:rPr/>
+              <a:t>The application you want is described in YAML</a:t>
+            </a:r>
+          </a:p>
+          <a:p>
+            <a:pPr lvl="0"/>
+            <a:r>
+              <a:rPr/>
+              <a:t>Create the initial Newt YAML through a conversational TUI</a:t>
+            </a:r>
+          </a:p>
+          <a:p>
+            <a:pPr lvl="0"/>
+            <a:r>
+              <a:rPr/>
+              <a:t>Newt generates the code you need</a:t>
+            </a:r>
+          </a:p>
+          <a:p>
+            <a:pPr lvl="0"/>
+            <a:r>
+              <a:rPr/>
+              <a:t>Customize by editing the generated code and managing your pipelines</a:t>
             </a:r>
           </a:p>
         </p:txBody>
@@ -3502,7 +3533,7 @@
             </a:pPr>
             <a:r>
               <a:rPr/>
-              <a:t>Steps one and two are interactive</a:t>
+              <a:t>How are data models described?</a:t>
             </a:r>
           </a:p>
         </p:txBody>
@@ -3522,15 +3553,24 @@
           <a:bodyPr/>
           <a:lstStyle/>
           <a:p>
-            <a:pPr lvl="0" indent="0">
-              <a:buNone/>
-            </a:pPr>
-            <a:r>
-              <a:rPr>
-                <a:latin typeface="Courier"/>
-              </a:rPr>
-              <a:t>  newt init app.yaml
-  newt model app.yaml</a:t>
+            <a:pPr lvl="0"/>
+            <a:r>
+              <a:rPr/>
+              <a:t>A model is a set of HTML form input types</a:t>
+            </a:r>
+          </a:p>
+          <a:p>
+            <a:pPr lvl="0"/>
+            <a:r>
+              <a:rPr/>
+              <a:t>Expressed using GitHub YAML Issue Template Syntax</a:t>
+            </a:r>
+          </a:p>
+          <a:p>
+            <a:pPr lvl="0"/>
+            <a:r>
+              <a:rPr/>
+              <a:t>Model describes HTML and implies SQL</a:t>
             </a:r>
           </a:p>
         </p:txBody>
@@ -3577,7 +3617,7 @@
             </a:pPr>
             <a:r>
               <a:rPr/>
-              <a:t>Step three, generate our code</a:t>
+              <a:t>How do I think things will work?</a:t>
             </a:r>
           </a:p>
         </p:txBody>
@@ -3597,23 +3637,48 @@
           <a:bodyPr/>
           <a:lstStyle/>
           <a:p>
-            <a:pPr lvl="0" indent="0">
-              <a:buNone/>
+            <a:pPr lvl="0" indent="-342900" marL="342900">
+              <a:buAutoNum type="arabicPeriod"/>
             </a:pPr>
             <a:r>
-              <a:rPr>
-                <a:latin typeface="Courier"/>
-              </a:rPr>
-              <a:t>  newt generate app.yaml</a:t>
-            </a:r>
-          </a:p>
-          <a:p>
-            <a:pPr lvl="0" indent="0" marL="1270000">
-              <a:buNone/>
+              <a:rPr/>
+              <a:t>Interactively generate our application’s YAML file</a:t>
+            </a:r>
+          </a:p>
+          <a:p>
+            <a:pPr lvl="0" indent="-342900" marL="342900">
+              <a:buAutoNum type="arabicPeriod"/>
             </a:pPr>
             <a:r>
-              <a:rPr sz="2000"/>
-              <a:t>Renders SQL, PostgREST conf, Mustache templates</a:t>
+              <a:rPr/>
+              <a:t>Interactively define data models</a:t>
+            </a:r>
+          </a:p>
+          <a:p>
+            <a:pPr lvl="0" indent="-342900" marL="342900">
+              <a:buAutoNum type="arabicPeriod"/>
+            </a:pPr>
+            <a:r>
+              <a:rPr/>
+              <a:t>Generate our application code</a:t>
+            </a:r>
+          </a:p>
+          <a:p>
+            <a:pPr lvl="0" indent="-342900" marL="342900">
+              <a:buAutoNum type="arabicPeriod"/>
+            </a:pPr>
+            <a:r>
+              <a:rPr/>
+              <a:t>Setup a primary data source</a:t>
+            </a:r>
+          </a:p>
+          <a:p>
+            <a:pPr lvl="0" indent="-342900" marL="342900">
+              <a:buAutoNum type="arabicPeriod"/>
+            </a:pPr>
+            <a:r>
+              <a:rPr/>
+              <a:t>Run our app with Newt</a:t>
             </a:r>
           </a:p>
         </p:txBody>
@@ -3660,7 +3725,7 @@
             </a:pPr>
             <a:r>
               <a:rPr/>
-              <a:t>Step four, setup Postgres and PostgREST</a:t>
+              <a:t>Steps one and two are interactive</a:t>
             </a:r>
           </a:p>
         </p:txBody>
@@ -3680,37 +3745,15 @@
           <a:bodyPr/>
           <a:lstStyle/>
           <a:p>
-            <a:pPr lvl="0" indent="-342900" marL="342900">
-              <a:buAutoNum type="arabicPeriod"/>
+            <a:pPr lvl="0" indent="0">
+              <a:buNone/>
             </a:pPr>
-            <a:r>
-              <a:rPr/>
-              <a:t>Use the generated SQL and configuration</a:t>
-            </a:r>
-          </a:p>
-          <a:p>
-            <a:pPr lvl="0" indent="-342900" marL="342900">
-              <a:buAutoNum type="arabicPeriod"/>
-            </a:pPr>
-            <a:r>
-              <a:rPr/>
-              <a:t>Setup and check via </a:t>
-            </a:r>
             <a:r>
               <a:rPr>
                 <a:latin typeface="Courier"/>
               </a:rPr>
-              <a:t>createdb</a:t>
-            </a:r>
-            <a:r>
-              <a:rPr/>
-              <a:t> and </a:t>
-            </a:r>
-            <a:r>
-              <a:rPr>
-                <a:latin typeface="Courier"/>
-              </a:rPr>
-              <a:t>psql</a:t>
+              <a:t>  newt init app.yaml
+  newt model app.yaml</a:t>
             </a:r>
           </a:p>
         </p:txBody>
@@ -3757,7 +3800,7 @@
             </a:pPr>
             <a:r>
               <a:rPr/>
-              <a:t>Step four, setup Postgres and PostgREST</a:t>
+              <a:t>Step three, generate our code</a:t>
             </a:r>
           </a:p>
         </p:txBody>
@@ -3784,10 +3827,7 @@
               <a:rPr>
                 <a:latin typeface="Courier"/>
               </a:rPr>
-              <a:t>  createdb app
-  psql app -c '\i setup.sql'
-  psql app -c '\i models.sql'
-  psql app -c '\dt'</a:t>
+              <a:t>  newt generate app.yaml</a:t>
             </a:r>
           </a:p>
           <a:p>
@@ -3796,7 +3836,7 @@
             </a:pPr>
             <a:r>
               <a:rPr sz="2000"/>
-              <a:t>should this be automated too?</a:t>
+              <a:t>Created a dataset collection and datasetd YAML file or render SQL, PostgREST conf Render Handlebars templates</a:t>
             </a:r>
           </a:p>
         </p:txBody>
@@ -3843,7 +3883,7 @@
             </a:pPr>
             <a:r>
               <a:rPr/>
-              <a:t>Step five, run your application and test</a:t>
+              <a:t>Step four, setup primary JSON data source</a:t>
             </a:r>
           </a:p>
         </p:txBody>
@@ -3863,23 +3903,34 @@
           <a:bodyPr/>
           <a:lstStyle/>
           <a:p>
-            <a:pPr lvl="0" indent="0">
+            <a:pPr lvl="0" indent="0" marL="0">
+              <a:spcBef>
+                <a:spcPts val="3000"/>
+              </a:spcBef>
               <a:buNone/>
             </a:pPr>
             <a:r>
-              <a:rPr>
+              <a:rPr b="1"/>
+              <a:t>Dataset collection</a:t>
+            </a:r>
+          </a:p>
+          <a:p>
+            <a:pPr lvl="0" indent="0" marL="1270000">
+              <a:buNone/>
+            </a:pPr>
+            <a:r>
+              <a:rPr sz="2000"/>
+              <a:t>Collection generation is done “automagically” by </a:t>
+            </a:r>
+            <a:r>
+              <a:rPr sz="2000">
                 <a:latin typeface="Courier"/>
               </a:rPr>
-              <a:t>  newt run app.yaml</a:t>
-            </a:r>
-          </a:p>
-          <a:p>
-            <a:pPr lvl="0" indent="0" marL="1270000">
-              <a:buNone/>
-            </a:pPr>
+              <a:t>newt generate app.yaml</a:t>
+            </a:r>
             <a:r>
               <a:rPr sz="2000"/>
-              <a:t>Point your web browser at http://localhost:8010 to test</a:t>
+              <a:t> datasetd YAML file gets generated so Newt can run the datasetd JSON API</a:t>
             </a:r>
           </a:p>
         </p:txBody>
@@ -3926,7 +3977,7 @@
             </a:pPr>
             <a:r>
               <a:rPr/>
-              <a:t>Can I run a demo?</a:t>
+              <a:t>Step four, setup the primary JSON data source</a:t>
             </a:r>
           </a:p>
         </p:txBody>
@@ -3947,11 +3998,48 @@
           <a:lstStyle/>
           <a:p>
             <a:pPr lvl="0" indent="0" marL="0">
+              <a:spcBef>
+                <a:spcPts val="3000"/>
+              </a:spcBef>
               <a:buNone/>
             </a:pPr>
             <a:r>
-              <a:rPr/>
-              <a:t>Not yet, hopefully in early DEcember 2024.</a:t>
+              <a:rPr b="1"/>
+              <a:t>Postgres+PostgREST</a:t>
+            </a:r>
+          </a:p>
+          <a:p>
+            <a:pPr lvl="0" indent="-342900" marL="342900">
+              <a:buAutoNum type="arabicPeriod"/>
+            </a:pPr>
+            <a:r>
+              <a:rPr/>
+              <a:t>Use the generated SQL and configuration</a:t>
+            </a:r>
+          </a:p>
+          <a:p>
+            <a:pPr lvl="0" indent="-342900" marL="342900">
+              <a:buAutoNum type="arabicPeriod"/>
+            </a:pPr>
+            <a:r>
+              <a:rPr/>
+              <a:t>Setup and check via </a:t>
+            </a:r>
+            <a:r>
+              <a:rPr>
+                <a:latin typeface="Courier"/>
+              </a:rPr>
+              <a:t>createdb</a:t>
+            </a:r>
+            <a:r>
+              <a:rPr/>
+              <a:t> and </a:t>
+            </a:r>
+            <a:r>
+              <a:rPr>
+                <a:latin typeface="Courier"/>
+              </a:rPr>
+              <a:t>psql</a:t>
             </a:r>
           </a:p>
         </p:txBody>
@@ -3998,7 +4086,7 @@
             </a:pPr>
             <a:r>
               <a:rPr/>
-              <a:t>Second prototype Status</a:t>
+              <a:t>Step four, setup Postgres and PostgREST</a:t>
             </a:r>
           </a:p>
         </p:txBody>
@@ -4018,24 +4106,26 @@
           <a:bodyPr/>
           <a:lstStyle/>
           <a:p>
-            <a:pPr lvl="0"/>
-            <a:r>
-              <a:rPr/>
-              <a:t>A work in progress (continuing in 2024)</a:t>
-            </a:r>
-          </a:p>
-          <a:p>
-            <a:pPr lvl="0"/>
-            <a:r>
-              <a:rPr/>
-              <a:t>Working prototype target date June 2025</a:t>
-            </a:r>
-          </a:p>
-          <a:p>
-            <a:pPr lvl="0"/>
-            <a:r>
-              <a:rPr/>
-              <a:t>Using internal applications as test bed</a:t>
+            <a:pPr lvl="0" indent="0">
+              <a:buNone/>
+            </a:pPr>
+            <a:r>
+              <a:rPr>
+                <a:latin typeface="Courier"/>
+              </a:rPr>
+              <a:t>  createdb app
+  psql app -c '\i setup.sql'
+  psql app -c '\i models.sql'
+  psql app -c '\dt'</a:t>
+            </a:r>
+          </a:p>
+          <a:p>
+            <a:pPr lvl="0" indent="0" marL="1270000">
+              <a:buNone/>
+            </a:pPr>
+            <a:r>
+              <a:rPr sz="2000"/>
+              <a:t>should this be automated too?</a:t>
             </a:r>
           </a:p>
         </p:txBody>
@@ -4166,7 +4256,7 @@
             </a:pPr>
             <a:r>
               <a:rPr/>
-              <a:t>How much is built?</a:t>
+              <a:t>Step five, run your application and test</a:t>
             </a:r>
           </a:p>
         </p:txBody>
@@ -4186,45 +4276,23 @@
           <a:bodyPr/>
           <a:lstStyle/>
           <a:p>
-            <a:pPr lvl="0"/>
-            <a:r>
-              <a:rPr/>
-              <a:t>☒ Newt developer tool</a:t>
-            </a:r>
-          </a:p>
-          <a:p>
-            <a:pPr lvl="0"/>
-            <a:r>
-              <a:rPr/>
-              <a:t>☒ Router is implemented and working</a:t>
-            </a:r>
-          </a:p>
-          <a:p>
-            <a:pPr lvl="0"/>
-            <a:r>
-              <a:rPr/>
-              <a:t>☒ Mustache template engine is working (but replaced)</a:t>
-            </a:r>
-          </a:p>
-          <a:p>
-            <a:pPr lvl="0"/>
-            <a:r>
-              <a:rPr/>
-              <a:t>☐ Handlebars template engine (in progress)</a:t>
-            </a:r>
-          </a:p>
-          <a:p>
-            <a:pPr lvl="0"/>
-            <a:r>
-              <a:rPr/>
-              <a:t>☐ Generator development (in progress)</a:t>
-            </a:r>
-          </a:p>
-          <a:p>
-            <a:pPr lvl="0"/>
-            <a:r>
-              <a:rPr/>
-              <a:t>☐ Modeler (design stage)</a:t>
+            <a:pPr lvl="0" indent="0">
+              <a:buNone/>
+            </a:pPr>
+            <a:r>
+              <a:rPr>
+                <a:latin typeface="Courier"/>
+              </a:rPr>
+              <a:t>  newt run app.yaml</a:t>
+            </a:r>
+          </a:p>
+          <a:p>
+            <a:pPr lvl="0" indent="0" marL="1270000">
+              <a:buNone/>
+            </a:pPr>
+            <a:r>
+              <a:rPr sz="2000"/>
+              <a:t>Point your web browser at http://localhost:8010 to test</a:t>
             </a:r>
           </a:p>
         </p:txBody>
@@ -4271,7 +4339,7 @@
             </a:pPr>
             <a:r>
               <a:rPr/>
-              <a:t>Insights from prototypes 1 &amp; 2</a:t>
+              <a:t>Can I run a demo?</a:t>
             </a:r>
           </a:p>
         </p:txBody>
@@ -4291,17 +4359,12 @@
           <a:bodyPr/>
           <a:lstStyle/>
           <a:p>
-            <a:pPr lvl="0"/>
-            <a:r>
-              <a:rPr/>
-              <a:t>“Off the shelf” is simpler</a:t>
-            </a:r>
-          </a:p>
-          <a:p>
-            <a:pPr lvl="0"/>
-            <a:r>
-              <a:rPr/>
-              <a:t>Lots of typing discourages use</a:t>
+            <a:pPr lvl="0" indent="0" marL="0">
+              <a:buNone/>
+            </a:pPr>
+            <a:r>
+              <a:rPr/>
+              <a:t>Not yet, hopefully in early December 2024.</a:t>
             </a:r>
           </a:p>
         </p:txBody>
@@ -4348,7 +4411,7 @@
             </a:pPr>
             <a:r>
               <a:rPr/>
-              <a:t>Insights from prototypes 1 &amp; 2</a:t>
+              <a:t>Third prototype Status</a:t>
             </a:r>
           </a:p>
         </p:txBody>
@@ -4371,28 +4434,21 @@
             <a:pPr lvl="0"/>
             <a:r>
               <a:rPr/>
-              <a:t>SQL turns people off, use a code generator</a:t>
-            </a:r>
-          </a:p>
-          <a:p>
-            <a:pPr lvl="0"/>
-            <a:r>
-              <a:rPr/>
-              <a:t>Hand typing templates is a turn off, use a code generator</a:t>
-            </a:r>
-          </a:p>
-          <a:p>
-            <a:pPr lvl="0"/>
-            <a:r>
-              <a:rPr/>
-              <a:t>Large YAML structures benefit from code generation</a:t>
-            </a:r>
-          </a:p>
-          <a:p>
-            <a:pPr lvl="0"/>
-            <a:r>
-              <a:rPr/>
-              <a:t>Automatic “wiring up” of routes and templates very helpful</a:t>
+              <a:t>A work in progress (continuing through 2024)</a:t>
+            </a:r>
+          </a:p>
+          <a:p>
+            <a:pPr lvl="0"/>
+            <a:r>
+              <a:rPr/>
+              <a:t>Working prototype target date June 2025</a:t>
+            </a:r>
+          </a:p>
+          <a:p>
+            <a:pPr lvl="0"/>
+            <a:r>
+              <a:rPr/>
+              <a:t>Using internal applications as test bed</a:t>
             </a:r>
           </a:p>
         </p:txBody>
@@ -4439,7 +4495,7 @@
             </a:pPr>
             <a:r>
               <a:rPr/>
-              <a:t>What’s next to wrap up prototype 3?</a:t>
+              <a:t>How much is built?</a:t>
             </a:r>
           </a:p>
         </p:txBody>
@@ -4462,14 +4518,50 @@
             <a:pPr lvl="0"/>
             <a:r>
               <a:rPr/>
-              <a:t>Debug and improve the code generator</a:t>
-            </a:r>
-          </a:p>
-          <a:p>
-            <a:pPr lvl="0"/>
-            <a:r>
-              <a:rPr/>
-              <a:t>Continue to implement a data modeler</a:t>
+              <a:t>☒ Newt developer tool</a:t>
+            </a:r>
+          </a:p>
+          <a:p>
+            <a:pPr lvl="0"/>
+            <a:r>
+              <a:rPr/>
+              <a:t>☒ Router is implemented and working</a:t>
+            </a:r>
+          </a:p>
+          <a:p>
+            <a:pPr lvl="0"/>
+            <a:r>
+              <a:rPr/>
+              <a:t>☒ </a:t>
+            </a:r>
+            <a:r>
+              <a:rPr strike="sngStrike"/>
+              <a:t>Mustache template engine is working</a:t>
+            </a:r>
+            <a:r>
+              <a:rPr/>
+              <a:t> (removed)</a:t>
+            </a:r>
+          </a:p>
+          <a:p>
+            <a:pPr lvl="0"/>
+            <a:r>
+              <a:rPr/>
+              <a:t>☐ Handlebars template engine (planning and design)</a:t>
+            </a:r>
+          </a:p>
+          <a:p>
+            <a:pPr lvl="0"/>
+            <a:r>
+              <a:rPr/>
+              <a:t>☐ Generator development (paused)</a:t>
+            </a:r>
+          </a:p>
+          <a:p>
+            <a:pPr lvl="0"/>
+            <a:r>
+              <a:rPr/>
+              <a:t>☐ Modeler (design stage)</a:t>
             </a:r>
           </a:p>
         </p:txBody>
@@ -4516,7 +4608,7 @@
             </a:pPr>
             <a:r>
               <a:rPr/>
-              <a:t>Unanswered Questions</a:t>
+              <a:t>Insights from prototypes 1 &amp; 2</a:t>
             </a:r>
           </a:p>
         </p:txBody>
@@ -4539,35 +4631,14 @@
             <a:pPr lvl="0"/>
             <a:r>
               <a:rPr/>
-              <a:t>What should be the minimum knowledge needed to use Newt?</a:t>
-            </a:r>
-          </a:p>
-          <a:p>
-            <a:pPr lvl="0"/>
-            <a:r>
-              <a:rPr/>
-              <a:t>What should come out of the box with Newt?</a:t>
-            </a:r>
-          </a:p>
-          <a:p>
-            <a:pPr lvl="1"/>
-            <a:r>
-              <a:rPr/>
-              <a:t>GUI tools via TypeScript+Deno?</a:t>
-            </a:r>
-          </a:p>
-          <a:p>
-            <a:pPr lvl="1"/>
-            <a:r>
-              <a:rPr/>
-              <a:t>Web components?</a:t>
-            </a:r>
-          </a:p>
-          <a:p>
-            <a:pPr lvl="1"/>
-            <a:r>
-              <a:rPr/>
-              <a:t>Ready made apps?</a:t>
+              <a:t>“Off the shelf” is simpler</a:t>
+            </a:r>
+          </a:p>
+          <a:p>
+            <a:pPr lvl="0"/>
+            <a:r>
+              <a:rPr/>
+              <a:t>Lots of typing discourages use</a:t>
             </a:r>
           </a:p>
         </p:txBody>
@@ -4614,7 +4685,7 @@
             </a:pPr>
             <a:r>
               <a:rPr/>
-              <a:t>Someday, maybe ideas</a:t>
+              <a:t>Insights from prototypes 1 &amp; 2</a:t>
             </a:r>
           </a:p>
         </p:txBody>
@@ -4637,28 +4708,28 @@
             <a:pPr lvl="0"/>
             <a:r>
               <a:rPr/>
-              <a:t>Direct SQLite 3 database support</a:t>
-            </a:r>
-          </a:p>
-          <a:p>
-            <a:pPr lvl="0"/>
-            <a:r>
-              <a:rPr/>
-              <a:t>A S3 protocol web service implementing object storage using OCFL</a:t>
-            </a:r>
-          </a:p>
-          <a:p>
-            <a:pPr lvl="0"/>
-            <a:r>
-              <a:rPr/>
-              <a:t>Web components for library, archive and museum metadata types</a:t>
-            </a:r>
-          </a:p>
-          <a:p>
-            <a:pPr lvl="0"/>
-            <a:r>
-              <a:rPr/>
-              <a:t>Visual programming would be easier than editing YAML files</a:t>
+              <a:t>SQL turns people off, use a code generator</a:t>
+            </a:r>
+          </a:p>
+          <a:p>
+            <a:pPr lvl="0"/>
+            <a:r>
+              <a:rPr/>
+              <a:t>Hand typing templates is a turn off, use a code generator</a:t>
+            </a:r>
+          </a:p>
+          <a:p>
+            <a:pPr lvl="0"/>
+            <a:r>
+              <a:rPr/>
+              <a:t>Large YAML structures benefit from code generation</a:t>
+            </a:r>
+          </a:p>
+          <a:p>
+            <a:pPr lvl="0"/>
+            <a:r>
+              <a:rPr/>
+              <a:t>Automatic “wiring up” of routes and templates very helpful</a:t>
             </a:r>
           </a:p>
         </p:txBody>
@@ -4705,7 +4776,7 @@
             </a:pPr>
             <a:r>
               <a:rPr/>
-              <a:t>Related resources</a:t>
+              <a:t>What’s next to wrap up prototype 3?</a:t>
             </a:r>
           </a:p>
         </p:txBody>
@@ -4728,49 +4799,28 @@
             <a:pPr lvl="0"/>
             <a:r>
               <a:rPr/>
-              <a:t>Newt </a:t>
-            </a:r>
-            <a:r>
-              <a:rPr>
-                <a:hlinkClick r:id="rId2"/>
-              </a:rPr>
-              <a:t>https://github.com/caltechlibrary/newt</a:t>
-            </a:r>
-          </a:p>
-          <a:p>
-            <a:pPr lvl="0"/>
-            <a:r>
-              <a:rPr/>
-              <a:t>Postgres </a:t>
-            </a:r>
-            <a:r>
-              <a:rPr>
-                <a:hlinkClick r:id="rId3"/>
-              </a:rPr>
-              <a:t>https://postgres.org</a:t>
-            </a:r>
-            <a:r>
-              <a:rPr/>
-              <a:t> + PostgREST </a:t>
-            </a:r>
-            <a:r>
-              <a:rPr>
-                <a:hlinkClick r:id="rId4"/>
-              </a:rPr>
-              <a:t>https://postgrest.org</a:t>
-            </a:r>
-          </a:p>
-          <a:p>
-            <a:pPr lvl="0"/>
-            <a:r>
-              <a:rPr>
-                <a:hlinkClick r:id="rId5"/>
-              </a:rPr>
-              <a:t>HandlebarsJS</a:t>
-            </a:r>
-            <a:r>
-              <a:rPr/>
-              <a:t> programming languages support</a:t>
+              <a:t>Implement new template engine, using HandlebarsJS, TypeScript and Deno</a:t>
+            </a:r>
+          </a:p>
+          <a:p>
+            <a:pPr lvl="0"/>
+            <a:r>
+              <a:rPr/>
+              <a:t>Debug and improve the code generator</a:t>
+            </a:r>
+          </a:p>
+          <a:p>
+            <a:pPr lvl="0"/>
+            <a:r>
+              <a:rPr/>
+              <a:t>Continue to implement a data modeler</a:t>
+            </a:r>
+          </a:p>
+          <a:p>
+            <a:pPr lvl="0"/>
+            <a:r>
+              <a:rPr/>
+              <a:t>Generate validation layer written in TypeScript and run by Deno</a:t>
             </a:r>
           </a:p>
         </p:txBody>
@@ -4817,7 +4867,7 @@
             </a:pPr>
             <a:r>
               <a:rPr/>
-              <a:t>Thank you!</a:t>
+              <a:t>Out of the box</a:t>
             </a:r>
           </a:p>
         </p:txBody>
@@ -4840,66 +4890,196 @@
             <a:pPr lvl="0"/>
             <a:r>
               <a:rPr/>
-              <a:t>This Presentation</a:t>
-            </a:r>
-          </a:p>
-          <a:p>
-            <a:pPr lvl="1"/>
-            <a:r>
-              <a:rPr/>
-              <a:t>pdf: </a:t>
-            </a:r>
-            <a:r>
-              <a:rPr>
-                <a:hlinkClick r:id="rId2"/>
-              </a:rPr>
-              <a:t>https://caltechlibrary.github.io/newt/presentation3/newt-p3.pdf</a:t>
-            </a:r>
-          </a:p>
-          <a:p>
-            <a:pPr lvl="1"/>
-            <a:r>
-              <a:rPr/>
-              <a:t>pptx: </a:t>
-            </a:r>
-            <a:r>
-              <a:rPr>
-                <a:hlinkClick r:id="rId3"/>
-              </a:rPr>
-              <a:t>https://caltechlibrary.github.io/newt/presentation3/newt-p3.pptx</a:t>
-            </a:r>
-          </a:p>
-          <a:p>
-            <a:pPr lvl="0"/>
-            <a:r>
-              <a:rPr/>
-              <a:t>Newt Documentation </a:t>
-            </a:r>
-            <a:r>
-              <a:rPr>
-                <a:hlinkClick r:id="rId4"/>
-              </a:rPr>
-              <a:t>https://caltechlibrary.github.io/newt</a:t>
-            </a:r>
-          </a:p>
-          <a:p>
-            <a:pPr lvl="0"/>
-            <a:r>
-              <a:rPr/>
-              <a:t>Source Code: </a:t>
-            </a:r>
-            <a:r>
-              <a:rPr>
-                <a:hlinkClick r:id="rId5"/>
-              </a:rPr>
-              <a:t>https://github.com/caltechlibrary/newt</a:t>
-            </a:r>
-          </a:p>
-          <a:p>
-            <a:pPr lvl="0"/>
-            <a:r>
-              <a:rPr/>
-              <a:t>Email: rsdoiel@caltech.edu</a:t>
+              <a:t>Newt (development tool)</a:t>
+            </a:r>
+          </a:p>
+          <a:p>
+            <a:pPr lvl="0"/>
+            <a:r>
+              <a:rPr/>
+              <a:t>Newt Router</a:t>
+            </a:r>
+          </a:p>
+          <a:p>
+            <a:pPr lvl="0"/>
+            <a:r>
+              <a:rPr/>
+              <a:t>Newt Template Engine</a:t>
+            </a:r>
+          </a:p>
+        </p:txBody>
+      </p:sp>
+    </p:spTree>
+  </p:cSld>
+</p:sld>
+</file>
+
+<file path=ppt/slides/slide28.xml><?xml version="1.0" encoding="utf-8"?>
+<p:sld xmlns:a="http://schemas.openxmlformats.org/drawingml/2006/main" xmlns:r="http://schemas.openxmlformats.org/officeDocument/2006/relationships" xmlns:p="http://schemas.openxmlformats.org/presentationml/2006/main">
+  <p:cSld>
+    <p:spTree>
+      <p:nvGrpSpPr>
+        <p:cNvPr id="1" name=""/>
+        <p:cNvGrpSpPr/>
+        <p:nvPr/>
+      </p:nvGrpSpPr>
+      <p:grpSpPr>
+        <a:xfrm>
+          <a:off x="0" y="0"/>
+          <a:ext cx="0" cy="0"/>
+          <a:chOff x="0" y="0"/>
+          <a:chExt cx="0" cy="0"/>
+        </a:xfrm>
+      </p:grpSpPr>
+      <p:sp>
+        <p:nvSpPr>
+          <p:cNvPr id="2" name="Title 1"/>
+          <p:cNvSpPr>
+            <a:spLocks noGrp="1"/>
+          </p:cNvSpPr>
+          <p:nvPr>
+            <p:ph type="title"/>
+          </p:nvPr>
+        </p:nvSpPr>
+        <p:spPr/>
+        <p:txBody>
+          <a:bodyPr/>
+          <a:lstStyle/>
+          <a:p>
+            <a:pPr lvl="0" indent="0" marL="0">
+              <a:buNone/>
+            </a:pPr>
+            <a:r>
+              <a:rPr/>
+              <a:t>Unanswered Questions</a:t>
+            </a:r>
+          </a:p>
+        </p:txBody>
+      </p:sp>
+      <p:sp>
+        <p:nvSpPr>
+          <p:cNvPr id="3" name="Content Placeholder 2"/>
+          <p:cNvSpPr>
+            <a:spLocks noGrp="1"/>
+          </p:cNvSpPr>
+          <p:nvPr>
+            <p:ph idx="1"/>
+          </p:nvPr>
+        </p:nvSpPr>
+        <p:spPr/>
+        <p:txBody>
+          <a:bodyPr/>
+          <a:lstStyle/>
+          <a:p>
+            <a:pPr lvl="0"/>
+            <a:r>
+              <a:rPr/>
+              <a:t>What is the minimum knowledge required to use Newt effectively?</a:t>
+            </a:r>
+          </a:p>
+          <a:p>
+            <a:pPr lvl="0"/>
+            <a:r>
+              <a:rPr/>
+              <a:t>Who is in the target audience?</a:t>
+            </a:r>
+          </a:p>
+        </p:txBody>
+      </p:sp>
+    </p:spTree>
+  </p:cSld>
+</p:sld>
+</file>
+
+<file path=ppt/slides/slide29.xml><?xml version="1.0" encoding="utf-8"?>
+<p:sld xmlns:a="http://schemas.openxmlformats.org/drawingml/2006/main" xmlns:r="http://schemas.openxmlformats.org/officeDocument/2006/relationships" xmlns:p="http://schemas.openxmlformats.org/presentationml/2006/main">
+  <p:cSld>
+    <p:spTree>
+      <p:nvGrpSpPr>
+        <p:cNvPr id="1" name=""/>
+        <p:cNvGrpSpPr/>
+        <p:nvPr/>
+      </p:nvGrpSpPr>
+      <p:grpSpPr>
+        <a:xfrm>
+          <a:off x="0" y="0"/>
+          <a:ext cx="0" cy="0"/>
+          <a:chOff x="0" y="0"/>
+          <a:chExt cx="0" cy="0"/>
+        </a:xfrm>
+      </p:grpSpPr>
+      <p:sp>
+        <p:nvSpPr>
+          <p:cNvPr id="2" name="Title 1"/>
+          <p:cNvSpPr>
+            <a:spLocks noGrp="1"/>
+          </p:cNvSpPr>
+          <p:nvPr>
+            <p:ph type="title"/>
+          </p:nvPr>
+        </p:nvSpPr>
+        <p:spPr/>
+        <p:txBody>
+          <a:bodyPr/>
+          <a:lstStyle/>
+          <a:p>
+            <a:pPr lvl="0" indent="0" marL="0">
+              <a:buNone/>
+            </a:pPr>
+            <a:r>
+              <a:rPr/>
+              <a:t>Someday, maybe ideas</a:t>
+            </a:r>
+          </a:p>
+        </p:txBody>
+      </p:sp>
+      <p:sp>
+        <p:nvSpPr>
+          <p:cNvPr id="3" name="Content Placeholder 2"/>
+          <p:cNvSpPr>
+            <a:spLocks noGrp="1"/>
+          </p:cNvSpPr>
+          <p:nvPr>
+            <p:ph idx="1"/>
+          </p:nvPr>
+        </p:nvSpPr>
+        <p:spPr/>
+        <p:txBody>
+          <a:bodyPr/>
+          <a:lstStyle/>
+          <a:p>
+            <a:pPr lvl="0"/>
+            <a:r>
+              <a:rPr/>
+              <a:t>A visual programming approach could be easier than editing YAML files</a:t>
+            </a:r>
+          </a:p>
+          <a:p>
+            <a:pPr lvl="0"/>
+            <a:r>
+              <a:rPr/>
+              <a:t>Direct SQLite 3 database support or integration</a:t>
+            </a:r>
+          </a:p>
+          <a:p>
+            <a:pPr lvl="0"/>
+            <a:r>
+              <a:rPr/>
+              <a:t>A S3 protocol web service implementing object storage using OCFL</a:t>
+            </a:r>
+          </a:p>
+          <a:p>
+            <a:pPr lvl="0"/>
+            <a:r>
+              <a:rPr/>
+              <a:t>Web components for library, archive and museum metadata types</a:t>
+            </a:r>
+          </a:p>
+          <a:p>
+            <a:pPr lvl="0"/>
+            <a:r>
+              <a:rPr/>
+              <a:t>Extend Newt through WASI+WASM run time modules and expose to use in pipelines</a:t>
             </a:r>
           </a:p>
         </p:txBody>
@@ -4946,7 +5126,7 @@
             </a:pPr>
             <a:r>
               <a:rPr/>
-              <a:t>Goal of Prototype 2: Answer the question.</a:t>
+              <a:t>Findings from Prototype 2:</a:t>
             </a:r>
           </a:p>
         </p:txBody>
@@ -4966,60 +5146,283 @@
           <a:bodyPr/>
           <a:lstStyle/>
           <a:p>
+            <a:pPr lvl="0" indent="0" marL="1270000">
+              <a:buNone/>
+            </a:pPr>
+            <a:r>
+              <a:rPr sz="2000"/>
+              <a:t>Is Newt and “off the shelf” software enough to create metadata curation applications?</a:t>
+            </a:r>
+          </a:p>
+          <a:p>
             <a:pPr lvl="0" indent="0" marL="0">
               <a:buNone/>
             </a:pPr>
             <a:r>
               <a:rPr/>
-              <a:t>Is Newt and “off the shelf” software enough to create metadata curation applications?</a:t>
-            </a:r>
-          </a:p>
+              <a:t>Short answer is </a:t>
+            </a:r>
+            <a:r>
+              <a:rPr b="1"/>
+              <a:t>yes</a:t>
+            </a:r>
+            <a:r>
+              <a:rPr/>
+              <a:t>. Longer answer is more nuanced.</a:t>
+            </a:r>
+          </a:p>
+        </p:txBody>
+      </p:sp>
+    </p:spTree>
+  </p:cSld>
+</p:sld>
+</file>
+
+<file path=ppt/slides/slide30.xml><?xml version="1.0" encoding="utf-8"?>
+<p:sld xmlns:a="http://schemas.openxmlformats.org/drawingml/2006/main" xmlns:r="http://schemas.openxmlformats.org/officeDocument/2006/relationships" xmlns:p="http://schemas.openxmlformats.org/presentationml/2006/main">
+  <p:cSld>
+    <p:spTree>
+      <p:nvGrpSpPr>
+        <p:cNvPr id="1" name=""/>
+        <p:cNvGrpSpPr/>
+        <p:nvPr/>
+      </p:nvGrpSpPr>
+      <p:grpSpPr>
+        <a:xfrm>
+          <a:off x="0" y="0"/>
+          <a:ext cx="0" cy="0"/>
+          <a:chOff x="0" y="0"/>
+          <a:chExt cx="0" cy="0"/>
+        </a:xfrm>
+      </p:grpSpPr>
+      <p:sp>
+        <p:nvSpPr>
+          <p:cNvPr id="2" name="Title 1"/>
+          <p:cNvSpPr>
+            <a:spLocks noGrp="1"/>
+          </p:cNvSpPr>
+          <p:nvPr>
+            <p:ph type="title"/>
+          </p:nvPr>
+        </p:nvSpPr>
+        <p:spPr/>
+        <p:txBody>
+          <a:bodyPr/>
+          <a:lstStyle/>
           <a:p>
             <a:pPr lvl="0" indent="0" marL="0">
-              <a:spcBef>
-                <a:spcPts val="3000"/>
-              </a:spcBef>
               <a:buNone/>
             </a:pPr>
             <a:r>
-              <a:rPr b="1"/>
-              <a:t>Prototype 2: findings</a:t>
-            </a:r>
-          </a:p>
-          <a:p>
-            <a:pPr lvl="0" indent="-342900" marL="342900">
-              <a:buAutoNum type="arabicPeriod"/>
+              <a:rPr/>
+              <a:t>Related resources</a:t>
+            </a:r>
+          </a:p>
+        </p:txBody>
+      </p:sp>
+      <p:sp>
+        <p:nvSpPr>
+          <p:cNvPr id="3" name="Content Placeholder 2"/>
+          <p:cNvSpPr>
+            <a:spLocks noGrp="1"/>
+          </p:cNvSpPr>
+          <p:nvPr>
+            <p:ph idx="1"/>
+          </p:nvPr>
+        </p:nvSpPr>
+        <p:spPr/>
+        <p:txBody>
+          <a:bodyPr/>
+          <a:lstStyle/>
+          <a:p>
+            <a:pPr lvl="0"/>
+            <a:r>
+              <a:rPr/>
+              <a:t>Newt </a:t>
+            </a:r>
+            <a:r>
+              <a:rPr>
+                <a:hlinkClick r:id="rId2"/>
+              </a:rPr>
+              <a:t>https://github.com/caltechlibrary/newt</a:t>
+            </a:r>
+          </a:p>
+          <a:p>
+            <a:pPr lvl="0"/>
+            <a:r>
+              <a:rPr/>
+              <a:t>Dataset + datasetd </a:t>
+            </a:r>
+            <a:r>
+              <a:rPr>
+                <a:hlinkClick r:id="rId3"/>
+              </a:rPr>
+              <a:t>https://github.com/caltechlibrary/dataset</a:t>
+            </a:r>
+          </a:p>
+          <a:p>
+            <a:pPr lvl="0"/>
+            <a:r>
+              <a:rPr/>
+              <a:t>Postgres </a:t>
+            </a:r>
+            <a:r>
+              <a:rPr>
+                <a:hlinkClick r:id="rId4"/>
+              </a:rPr>
+              <a:t>https://postgres.org</a:t>
+            </a:r>
+            <a:r>
+              <a:rPr/>
+              <a:t> + PostgREST </a:t>
+            </a:r>
+            <a:r>
+              <a:rPr>
+                <a:hlinkClick r:id="rId5"/>
+              </a:rPr>
+              <a:t>https://postgrest.org</a:t>
+            </a:r>
+          </a:p>
+          <a:p>
+            <a:pPr lvl="0"/>
+            <a:r>
+              <a:rPr>
+                <a:hlinkClick r:id="rId6"/>
+              </a:rPr>
+              <a:t>HandlebarsJS</a:t>
+            </a:r>
+            <a:r>
+              <a:rPr/>
+              <a:t> programming languages support</a:t>
+            </a:r>
+          </a:p>
+        </p:txBody>
+      </p:sp>
+    </p:spTree>
+  </p:cSld>
+</p:sld>
+</file>
+
+<file path=ppt/slides/slide31.xml><?xml version="1.0" encoding="utf-8"?>
+<p:sld xmlns:a="http://schemas.openxmlformats.org/drawingml/2006/main" xmlns:r="http://schemas.openxmlformats.org/officeDocument/2006/relationships" xmlns:p="http://schemas.openxmlformats.org/presentationml/2006/main">
+  <p:cSld>
+    <p:spTree>
+      <p:nvGrpSpPr>
+        <p:cNvPr id="1" name=""/>
+        <p:cNvGrpSpPr/>
+        <p:nvPr/>
+      </p:nvGrpSpPr>
+      <p:grpSpPr>
+        <a:xfrm>
+          <a:off x="0" y="0"/>
+          <a:ext cx="0" cy="0"/>
+          <a:chOff x="0" y="0"/>
+          <a:chExt cx="0" cy="0"/>
+        </a:xfrm>
+      </p:grpSpPr>
+      <p:sp>
+        <p:nvSpPr>
+          <p:cNvPr id="2" name="Title 1"/>
+          <p:cNvSpPr>
+            <a:spLocks noGrp="1"/>
+          </p:cNvSpPr>
+          <p:nvPr>
+            <p:ph type="title"/>
+          </p:nvPr>
+        </p:nvSpPr>
+        <p:spPr/>
+        <p:txBody>
+          <a:bodyPr/>
+          <a:lstStyle/>
+          <a:p>
+            <a:pPr lvl="0" indent="0" marL="0">
+              <a:buNone/>
             </a:pPr>
             <a:r>
               <a:rPr/>
-              <a:t>YAML file can grow very large for a “real world” applications with multiple models of objects</a:t>
-            </a:r>
-          </a:p>
-          <a:p>
-            <a:pPr lvl="0" indent="-342900" marL="342900">
-              <a:buAutoNum type="arabicPeriod"/>
-            </a:pPr>
-            <a:r>
-              <a:rPr/>
-              <a:t>Model vetting should happen via generated code but probably not Golang code. TypeScript/JavaScript via Deno seems promising</a:t>
-            </a:r>
-          </a:p>
-          <a:p>
-            <a:pPr lvl="0" indent="-342900" marL="342900">
-              <a:buAutoNum type="arabicPeriod"/>
-            </a:pPr>
-            <a:r>
-              <a:rPr/>
-              <a:t>Postgres+PostgREST is a powerful combination but it’d be nice to have something simpler. Dataset collections running behind datasetd seem promising.</a:t>
-            </a:r>
-          </a:p>
-          <a:p>
-            <a:pPr lvl="0" indent="-342900" marL="342900">
-              <a:buAutoNum type="arabicPeriod"/>
-            </a:pPr>
-            <a:r>
-              <a:rPr/>
-              <a:t>Managing the YAML file should be more conversational</a:t>
+              <a:t>Thank you!</a:t>
+            </a:r>
+          </a:p>
+        </p:txBody>
+      </p:sp>
+      <p:sp>
+        <p:nvSpPr>
+          <p:cNvPr id="3" name="Content Placeholder 2"/>
+          <p:cNvSpPr>
+            <a:spLocks noGrp="1"/>
+          </p:cNvSpPr>
+          <p:nvPr>
+            <p:ph idx="1"/>
+          </p:nvPr>
+        </p:nvSpPr>
+        <p:spPr/>
+        <p:txBody>
+          <a:bodyPr/>
+          <a:lstStyle/>
+          <a:p>
+            <a:pPr lvl="0"/>
+            <a:r>
+              <a:rPr/>
+              <a:t>This Presentation</a:t>
+            </a:r>
+          </a:p>
+          <a:p>
+            <a:pPr lvl="1"/>
+            <a:r>
+              <a:rPr/>
+              <a:t>pdf: </a:t>
+            </a:r>
+            <a:r>
+              <a:rPr>
+                <a:hlinkClick r:id="rId2"/>
+              </a:rPr>
+              <a:t>https://caltechlibrary.github.io/newt/presentation3/newt-p3.pdf</a:t>
+            </a:r>
+          </a:p>
+          <a:p>
+            <a:pPr lvl="1"/>
+            <a:r>
+              <a:rPr/>
+              <a:t>pptx: </a:t>
+            </a:r>
+            <a:r>
+              <a:rPr>
+                <a:hlinkClick r:id="rId3"/>
+              </a:rPr>
+              <a:t>https://caltechlibrary.github.io/newt/presentation3/newt-p3.pptx</a:t>
+            </a:r>
+          </a:p>
+          <a:p>
+            <a:pPr lvl="0"/>
+            <a:r>
+              <a:rPr/>
+              <a:t>Newt Documentation </a:t>
+            </a:r>
+            <a:r>
+              <a:rPr>
+                <a:hlinkClick r:id="rId4"/>
+              </a:rPr>
+              <a:t>https://caltechlibrary.github.io/newt</a:t>
+            </a:r>
+          </a:p>
+          <a:p>
+            <a:pPr lvl="0"/>
+            <a:r>
+              <a:rPr/>
+              <a:t>Source Code: </a:t>
+            </a:r>
+            <a:r>
+              <a:rPr>
+                <a:hlinkClick r:id="rId5"/>
+              </a:rPr>
+              <a:t>https://github.com/caltechlibrary/newt</a:t>
+            </a:r>
+          </a:p>
+          <a:p>
+            <a:pPr lvl="0"/>
+            <a:r>
+              <a:rPr/>
+              <a:t>Email: rsdoiel@caltech.edu</a:t>
             </a:r>
           </a:p>
         </p:txBody>
@@ -5066,7 +5469,7 @@
             </a:pPr>
             <a:r>
               <a:rPr/>
-              <a:t>Goal of Prototype 3: Answer these questions three.</a:t>
+              <a:t>Findings from Prototype 2:</a:t>
             </a:r>
           </a:p>
         </p:txBody>
@@ -5085,13 +5488,22 @@
         <p:txBody>
           <a:bodyPr/>
           <a:lstStyle/>
+          <a:p>
+            <a:pPr lvl="0" indent="0" marL="1270000">
+              <a:buNone/>
+            </a:pPr>
+            <a:r>
+              <a:rPr sz="2000"/>
+              <a:t>Is Newt and “off the shelf” software enough to create metadata curation applications?</a:t>
+            </a:r>
+          </a:p>
           <a:p>
             <a:pPr lvl="0" indent="-342900" marL="342900">
               <a:buAutoNum type="arabicPeriod"/>
             </a:pPr>
             <a:r>
               <a:rPr/>
-              <a:t>Is generating TypeScript programs a suitable way to solve the validator problemw while leaving room for customization?</a:t>
+              <a:t>Newt’s YAML file can grow very large for applications with many data models</a:t>
             </a:r>
           </a:p>
           <a:p>
@@ -5100,7 +5512,7 @@
             </a:pPr>
             <a:r>
               <a:rPr/>
-              <a:t>Is TypeScript suitable for generated code to common external services? (e.g. ORCID, ROR)</a:t>
+              <a:t>Model vetting and validation should happen early in the data pipeline, ideally as a generated program</a:t>
             </a:r>
           </a:p>
           <a:p>
@@ -5109,7 +5521,7 @@
             </a:pPr>
             <a:r>
               <a:rPr/>
-              <a:t>Is HandlebarsJS via TypeScript a good fit for managing data views?</a:t>
+              <a:t>Postgres+PostgREST is a powerful combination but it’d be nice to have something simpler</a:t>
             </a:r>
           </a:p>
           <a:p>
@@ -5118,7 +5530,7 @@
             </a:pPr>
             <a:r>
               <a:rPr/>
-              <a:t>What default JSON data sources should be supported? (e.g. Postgres+PostgREST, dataset collection hosted with datasetd)</a:t>
+              <a:t>Managing the YAML file can be done conversationally</a:t>
             </a:r>
           </a:p>
         </p:txBody>
@@ -5165,7 +5577,7 @@
             </a:pPr>
             <a:r>
               <a:rPr/>
-              <a:t>High level Concepts (remaing the same)</a:t>
+              <a:t>Questions raised by Prototype 2:</a:t>
             </a:r>
           </a:p>
         </p:txBody>
@@ -5188,14 +5600,21 @@
             <a:pPr lvl="0"/>
             <a:r>
               <a:rPr/>
-              <a:t>describe the application you want</a:t>
-            </a:r>
-          </a:p>
-          <a:p>
-            <a:pPr lvl="0"/>
-            <a:r>
-              <a:rPr/>
-              <a:t>generate the application you described</a:t>
+              <a:t>Where do I focus our simplification efforts?</a:t>
+            </a:r>
+          </a:p>
+          <a:p>
+            <a:pPr lvl="0"/>
+            <a:r>
+              <a:rPr/>
+              <a:t>How do I ensure that large YAML files remaining human managable?</a:t>
+            </a:r>
+          </a:p>
+          <a:p>
+            <a:pPr lvl="0"/>
+            <a:r>
+              <a:rPr/>
+              <a:t>Mustache template language is a little too simple, what should replace it?</a:t>
             </a:r>
           </a:p>
         </p:txBody>
@@ -5242,7 +5661,7 @@
             </a:pPr>
             <a:r>
               <a:rPr/>
-              <a:t>Implementation Concepts</a:t>
+              <a:t>Goal of Prototype 3: Answer these questions three.</a:t>
             </a:r>
           </a:p>
         </p:txBody>
@@ -5262,38 +5681,30 @@
           <a:bodyPr/>
           <a:lstStyle/>
           <a:p>
-            <a:pPr lvl="0"/>
-            <a:r>
-              <a:rPr/>
-              <a:t>data sources</a:t>
-            </a:r>
-          </a:p>
-          <a:p>
-            <a:pPr lvl="0"/>
-            <a:r>
-              <a:rPr/>
-              <a:t>data models</a:t>
-            </a:r>
-          </a:p>
-          <a:p>
-            <a:pPr lvl="0"/>
-            <a:r>
-              <a:rPr/>
-              <a:t>routing requests through data pipelines</a:t>
-            </a:r>
-          </a:p>
-          <a:p>
-            <a:pPr lvl="0"/>
-            <a:r>
-              <a:rPr/>
-              <a:t>rendering JSON responses via template engine (now HandlebarsJS)</a:t>
-            </a:r>
-          </a:p>
-          <a:p>
-            <a:pPr lvl="0"/>
-            <a:r>
-              <a:rPr/>
-              <a:t>generated validation and proxy code (e.g. TypeScript+Deno)</a:t>
+            <a:pPr lvl="0" indent="-342900" marL="342900">
+              <a:buAutoNum type="arabicPeriod"/>
+            </a:pPr>
+            <a:r>
+              <a:rPr/>
+              <a:t>Is generating TypeScript programs a suitable way to solve the validator problem?</a:t>
+            </a:r>
+          </a:p>
+          <a:p>
+            <a:pPr lvl="0" indent="-342900" marL="342900">
+              <a:buAutoNum type="arabicPeriod"/>
+            </a:pPr>
+            <a:r>
+              <a:rPr/>
+              <a:t>Is HandlebarsJS via TypeScript a good fit for managing data views?</a:t>
+            </a:r>
+          </a:p>
+          <a:p>
+            <a:pPr lvl="0" indent="-342900" marL="342900">
+              <a:buAutoNum type="arabicPeriod"/>
+            </a:pPr>
+            <a:r>
+              <a:rPr/>
+              <a:t>What default JSON data sources should be supported? (e.g. Postgres+PostgREST, dataset+datasetd)</a:t>
             </a:r>
           </a:p>
         </p:txBody>
@@ -5340,7 +5751,7 @@
             </a:pPr>
             <a:r>
               <a:rPr/>
-              <a:t>Themes</a:t>
+              <a:t>High level Concepts (remaing the same)</a:t>
             </a:r>
           </a:p>
         </p:txBody>
@@ -5363,21 +5774,21 @@
             <a:pPr lvl="0"/>
             <a:r>
               <a:rPr/>
-              <a:t>Pick Simple = (No coding) + (Less coding)</a:t>
-            </a:r>
-          </a:p>
-          <a:p>
-            <a:pPr lvl="0"/>
-            <a:r>
-              <a:rPr/>
-              <a:t>Compose applications using data pipelines and templates</a:t>
-            </a:r>
-          </a:p>
-          <a:p>
-            <a:pPr lvl="0"/>
-            <a:r>
-              <a:rPr/>
-              <a:t>Avoid inventing new things</a:t>
+              <a:t>describe the application you want</a:t>
+            </a:r>
+          </a:p>
+          <a:p>
+            <a:pPr lvl="0"/>
+            <a:r>
+              <a:rPr/>
+              <a:t>generate the application you described</a:t>
+            </a:r>
+          </a:p>
+          <a:p>
+            <a:pPr lvl="0"/>
+            <a:r>
+              <a:rPr/>
+              <a:t>running the application using a service oriented architecture</a:t>
             </a:r>
           </a:p>
         </p:txBody>
@@ -5424,7 +5835,7 @@
             </a:pPr>
             <a:r>
               <a:rPr/>
-              <a:t>Off the shelf (no coding)</a:t>
+              <a:t>Implementation Concepts (remaining the same)</a:t>
             </a:r>
           </a:p>
         </p:txBody>
@@ -5447,68 +5858,21 @@
             <a:pPr lvl="0"/>
             <a:r>
               <a:rPr/>
-              <a:t>Data Sources</a:t>
-            </a:r>
-          </a:p>
-          <a:p>
-            <a:pPr lvl="1"/>
-            <a:r>
-              <a:rPr>
-                <a:hlinkClick r:id="rId2"/>
-              </a:rPr>
-              <a:t>Postgres</a:t>
-            </a:r>
-            <a:r>
-              <a:rPr/>
-              <a:t> and </a:t>
-            </a:r>
-            <a:r>
-              <a:rPr>
-                <a:hlinkClick r:id="rId3"/>
-              </a:rPr>
-              <a:t>PostgREST</a:t>
-            </a:r>
-          </a:p>
-          <a:p>
-            <a:pPr lvl="1"/>
-            <a:r>
-              <a:rPr>
-                <a:hlinkClick r:id="rId4"/>
-              </a:rPr>
-              <a:t>Dataset + datasetd</a:t>
-            </a:r>
-          </a:p>
-          <a:p>
-            <a:pPr lvl="1"/>
-            <a:r>
-              <a:rPr>
-                <a:hlinkClick r:id="rId5"/>
-              </a:rPr>
-              <a:t>Solr</a:t>
-            </a:r>
-            <a:r>
-              <a:rPr/>
-              <a:t> or </a:t>
-            </a:r>
-            <a:r>
-              <a:rPr>
-                <a:hlinkClick r:id="rId6"/>
-              </a:rPr>
-              <a:t>OpenSearch</a:t>
-            </a:r>
-          </a:p>
-          <a:p>
-            <a:pPr lvl="0"/>
-            <a:r>
-              <a:rPr/>
-              <a:t>Newt Handlebars =&gt; Transform JSON into web pages</a:t>
-            </a:r>
-          </a:p>
-          <a:p>
-            <a:pPr lvl="0"/>
-            <a:r>
-              <a:rPr/>
-              <a:t>Newt Router, ties it all together</a:t>
+              <a:t>data sources</a:t>
+            </a:r>
+          </a:p>
+          <a:p>
+            <a:pPr lvl="0"/>
+            <a:r>
+              <a:rPr/>
+              <a:t>data models</a:t>
+            </a:r>
+          </a:p>
+          <a:p>
+            <a:pPr lvl="0"/>
+            <a:r>
+              <a:rPr/>
+              <a:t>routing requests through data pipelines</a:t>
             </a:r>
           </a:p>
         </p:txBody>
@@ -5555,7 +5919,7 @@
             </a:pPr>
             <a:r>
               <a:rPr/>
-              <a:t>Office the shelf (other data sources)</a:t>
+              <a:t>Themes (remaing the same)</a:t>
             </a:r>
           </a:p>
         </p:txBody>
@@ -5578,21 +5942,21 @@
             <a:pPr lvl="0"/>
             <a:r>
               <a:rPr/>
-              <a:t>ArchivesSpace, RDM -&gt; JSON API</a:t>
-            </a:r>
-          </a:p>
-          <a:p>
-            <a:pPr lvl="0"/>
-            <a:r>
-              <a:rPr/>
-              <a:t>ORCID, ROR, CrossRef, DataCite -&gt; JSON API</a:t>
-            </a:r>
-          </a:p>
-          <a:p>
-            <a:pPr lvl="0"/>
-            <a:r>
-              <a:rPr/>
-              <a:t>What about intergrating external services?</a:t>
+              <a:t>Pick Simple = (No coding) + (Less coding)</a:t>
+            </a:r>
+          </a:p>
+          <a:p>
+            <a:pPr lvl="0"/>
+            <a:r>
+              <a:rPr/>
+              <a:t>Compose applications using data pipelines and templates</a:t>
+            </a:r>
+          </a:p>
+          <a:p>
+            <a:pPr lvl="0"/>
+            <a:r>
+              <a:rPr/>
+              <a:t>Avoid inventing new things</a:t>
             </a:r>
           </a:p>
         </p:txBody>

</xml_diff>

<commit_message>
rethinking template engine approach
</commit_message>
<xml_diff>
--- a/presentation3/newt-p3.pptx
+++ b/presentation3/newt-p3.pptx
@@ -34,8 +34,6 @@
     <p:sldId id="282" r:id="rId28"/>
     <p:sldId id="283" r:id="rId29"/>
     <p:sldId id="284" r:id="rId30"/>
-    <p:sldId id="285" r:id="rId31"/>
-    <p:sldId id="286" r:id="rId32"/>
   </p:sldIdLst>
   <p:sldSz cx="9144000" cy="5143500" type="screen16x9"/>
   <p:notesSz cx="6858000" cy="9144000"/>
@@ -3230,7 +3228,7 @@
             </a:pPr>
             <a:r>
               <a:rPr/>
-              <a:t>Goal of Prototype 3: Extra credit question</a:t>
+              <a:t>Changes from last prototype</a:t>
             </a:r>
           </a:p>
         </p:txBody>
@@ -3253,7 +3251,42 @@
             <a:pPr lvl="0"/>
             <a:r>
               <a:rPr/>
-              <a:t>Can I leverage WASI+WASM to make useful Python libraries available to Deno and browser?</a:t>
+              <a:t>Removed some Go cli (e.g. ws, mustache, newtmustache)</a:t>
+            </a:r>
+          </a:p>
+          <a:p>
+            <a:pPr lvl="0"/>
+            <a:r>
+              <a:rPr/>
+              <a:t>Renamed newtrouter -&gt; ndr (Newt Data Router)</a:t>
+            </a:r>
+          </a:p>
+          <a:p>
+            <a:pPr lvl="0"/>
+            <a:r>
+              <a:rPr/>
+              <a:t>Added nte (Newt Template Engine)</a:t>
+            </a:r>
+          </a:p>
+          <a:p>
+            <a:pPr lvl="0"/>
+            <a:r>
+              <a:rPr/>
+              <a:t>Generating collection and YAML for dataset+datasetd</a:t>
+            </a:r>
+          </a:p>
+          <a:p>
+            <a:pPr lvl="0"/>
+            <a:r>
+              <a:rPr/>
+              <a:t>Generating Handlebars templates</a:t>
+            </a:r>
+          </a:p>
+          <a:p>
+            <a:pPr lvl="0"/>
+            <a:r>
+              <a:rPr/>
+              <a:t>Generating TypeScript validator as middleware run via Deno</a:t>
             </a:r>
           </a:p>
         </p:txBody>
@@ -3300,7 +3333,7 @@
             </a:pPr>
             <a:r>
               <a:rPr/>
-              <a:t>Changes from last prototype</a:t>
+              <a:t>Off the shelf (no coding)</a:t>
             </a:r>
           </a:p>
         </p:txBody>
@@ -3323,42 +3356,49 @@
             <a:pPr lvl="0"/>
             <a:r>
               <a:rPr/>
-              <a:t>Removed some Go cli (e.g. ws, mustache, newtmustache)</a:t>
-            </a:r>
-          </a:p>
-          <a:p>
-            <a:pPr lvl="0"/>
-            <a:r>
-              <a:rPr/>
-              <a:t>Generating collection and YAML for dataset+datasetd</a:t>
-            </a:r>
-          </a:p>
-          <a:p>
-            <a:pPr lvl="0"/>
-            <a:r>
-              <a:rPr/>
-              <a:t>Generating Handlebars templates</a:t>
-            </a:r>
-          </a:p>
-          <a:p>
-            <a:pPr lvl="0"/>
-            <a:r>
-              <a:rPr/>
-              <a:t>Generating TypeScript validator as middleware run via Deno</a:t>
-            </a:r>
-          </a:p>
-          <a:p>
-            <a:pPr lvl="0"/>
-            <a:r>
-              <a:rPr/>
-              <a:t>Generating Handlebars as template engine as middleware run via Deno</a:t>
-            </a:r>
-          </a:p>
-          <a:p>
-            <a:pPr lvl="0"/>
-            <a:r>
-              <a:rPr/>
-              <a:t>Using Deno to generate JS/ES6 for web browser</a:t>
+              <a:t>JSON Data Source</a:t>
+            </a:r>
+          </a:p>
+          <a:p>
+            <a:pPr lvl="1"/>
+            <a:r>
+              <a:rPr>
+                <a:hlinkClick r:id="rId2"/>
+              </a:rPr>
+              <a:t>Dataset + datasetd</a:t>
+            </a:r>
+          </a:p>
+          <a:p>
+            <a:pPr lvl="1"/>
+            <a:r>
+              <a:rPr>
+                <a:hlinkClick r:id="rId3"/>
+              </a:rPr>
+              <a:t>Postgres</a:t>
+            </a:r>
+            <a:r>
+              <a:rPr/>
+              <a:t> + </a:t>
+            </a:r>
+            <a:r>
+              <a:rPr>
+                <a:hlinkClick r:id="rId4"/>
+              </a:rPr>
+              <a:t>PostgREST</a:t>
+            </a:r>
+          </a:p>
+          <a:p>
+            <a:pPr lvl="0"/>
+            <a:r>
+              <a:rPr/>
+              <a:t>newt, ndr, and nte</a:t>
+            </a:r>
+          </a:p>
+          <a:p>
+            <a:pPr lvl="0"/>
+            <a:r>
+              <a:rPr/>
+              <a:t>Deno to run TypeScript middleware</a:t>
             </a:r>
           </a:p>
         </p:txBody>
@@ -3405,7 +3445,7 @@
             </a:pPr>
             <a:r>
               <a:rPr/>
-              <a:t>Off the shelf (no coding)</a:t>
+              <a:t>Assemble app from YAML (less coding)</a:t>
             </a:r>
           </a:p>
         </p:txBody>
@@ -3428,49 +3468,14 @@
             <a:pPr lvl="0"/>
             <a:r>
               <a:rPr/>
-              <a:t>JSON Data Source</a:t>
-            </a:r>
-          </a:p>
-          <a:p>
-            <a:pPr lvl="1"/>
-            <a:r>
-              <a:rPr>
-                <a:hlinkClick r:id="rId2"/>
-              </a:rPr>
-              <a:t>Dataset + datasetd</a:t>
-            </a:r>
-          </a:p>
-          <a:p>
-            <a:pPr lvl="1"/>
-            <a:r>
-              <a:rPr>
-                <a:hlinkClick r:id="rId3"/>
-              </a:rPr>
-              <a:t>Postgres</a:t>
-            </a:r>
-            <a:r>
-              <a:rPr/>
-              <a:t> + </a:t>
-            </a:r>
-            <a:r>
-              <a:rPr>
-                <a:hlinkClick r:id="rId4"/>
-              </a:rPr>
-              <a:t>PostgREST</a:t>
-            </a:r>
-          </a:p>
-          <a:p>
-            <a:pPr lvl="0"/>
-            <a:r>
-              <a:rPr/>
-              <a:t>TypeScript middleware run via Deno</a:t>
-            </a:r>
-          </a:p>
-          <a:p>
-            <a:pPr lvl="0"/>
-            <a:r>
-              <a:rPr/>
-              <a:t>Newt Router, ties it all together</a:t>
+              <a:t>Create the initial Newt YAML through a conversational TUI</a:t>
+            </a:r>
+          </a:p>
+          <a:p>
+            <a:pPr lvl="0"/>
+            <a:r>
+              <a:rPr/>
+              <a:t>Data modeling via a conversational TUI</a:t>
             </a:r>
           </a:p>
         </p:txBody>
@@ -3517,7 +3522,7 @@
             </a:pPr>
             <a:r>
               <a:rPr/>
-              <a:t>Other Off the self</a:t>
+              <a:t>How are data models described?</a:t>
             </a:r>
           </a:p>
         </p:txBody>
@@ -3539,19 +3544,22 @@
           <a:p>
             <a:pPr lvl="0"/>
             <a:r>
-              <a:rPr>
-                <a:hlinkClick r:id="rId2"/>
-              </a:rPr>
-              <a:t>Solr</a:t>
-            </a:r>
-          </a:p>
-          <a:p>
-            <a:pPr lvl="0"/>
-            <a:r>
-              <a:rPr>
-                <a:hlinkClick r:id="rId3"/>
-              </a:rPr>
-              <a:t>OpenSearch</a:t>
+              <a:rPr/>
+              <a:t>A model is a set of HTML form input types</a:t>
+            </a:r>
+          </a:p>
+          <a:p>
+            <a:pPr lvl="0"/>
+            <a:r>
+              <a:rPr/>
+              <a:t>Expressed using GitHub YAML Issue Template Syntax</a:t>
+            </a:r>
+          </a:p>
+          <a:p>
+            <a:pPr lvl="0"/>
+            <a:r>
+              <a:rPr/>
+              <a:t>Model describes HTML and implies SQL</a:t>
             </a:r>
           </a:p>
         </p:txBody>
@@ -3598,7 +3606,7 @@
             </a:pPr>
             <a:r>
               <a:rPr/>
-              <a:t>Assemble app from YAML (less coding)</a:t>
+              <a:t>How do I think things will work?</a:t>
             </a:r>
           </a:p>
         </p:txBody>
@@ -3618,31 +3626,68 @@
           <a:bodyPr/>
           <a:lstStyle/>
           <a:p>
-            <a:pPr lvl="0"/>
-            <a:r>
-              <a:rPr/>
-              <a:t>The application you want is described in YAML</a:t>
-            </a:r>
-          </a:p>
-          <a:p>
-            <a:pPr lvl="0"/>
-            <a:r>
-              <a:rPr/>
-              <a:t>Create the initial Newt YAML through a conversational TUI</a:t>
-            </a:r>
-          </a:p>
-          <a:p>
-            <a:pPr lvl="0"/>
-            <a:r>
-              <a:rPr/>
-              <a:t>Newt generates the code you need</a:t>
-            </a:r>
-          </a:p>
-          <a:p>
-            <a:pPr lvl="0"/>
-            <a:r>
-              <a:rPr/>
-              <a:t>Customize by editing the generated code and managing your pipelines</a:t>
+            <a:pPr lvl="0" indent="-342900" marL="342900">
+              <a:buAutoNum type="arabicPeriod"/>
+            </a:pPr>
+            <a:r>
+              <a:rPr/>
+              <a:t>Interactively generate our application’s YAML file</a:t>
+            </a:r>
+          </a:p>
+          <a:p>
+            <a:pPr lvl="0" indent="-342900" marL="342900">
+              <a:buAutoNum type="arabicPeriod"/>
+            </a:pPr>
+            <a:r>
+              <a:rPr/>
+              <a:t>Interactively define data models</a:t>
+            </a:r>
+          </a:p>
+          <a:p>
+            <a:pPr lvl="0" indent="-342900" marL="342900">
+              <a:buAutoNum type="arabicPeriod"/>
+            </a:pPr>
+            <a:r>
+              <a:rPr/>
+              <a:t>Generate our application code</a:t>
+            </a:r>
+          </a:p>
+          <a:p>
+            <a:pPr lvl="0" indent="-342900" marL="342900">
+              <a:buAutoNum type="arabicPeriod"/>
+            </a:pPr>
+            <a:r>
+              <a:rPr/>
+              <a:t>Run </a:t>
+            </a:r>
+            <a:r>
+              <a:rPr>
+                <a:latin typeface="Courier"/>
+              </a:rPr>
+              <a:t>newt generate ...</a:t>
+            </a:r>
+            <a:r>
+              <a:rPr/>
+              <a:t> for primary data source</a:t>
+            </a:r>
+          </a:p>
+          <a:p>
+            <a:pPr lvl="0" indent="-342900" marL="342900">
+              <a:buAutoNum type="arabicPeriod"/>
+            </a:pPr>
+            <a:r>
+              <a:rPr/>
+              <a:t>Run </a:t>
+            </a:r>
+            <a:r>
+              <a:rPr>
+                <a:latin typeface="Courier"/>
+              </a:rPr>
+              <a:t>newt run ...</a:t>
+            </a:r>
+            <a:r>
+              <a:rPr/>
+              <a:t> to run the application</a:t>
             </a:r>
           </a:p>
         </p:txBody>
@@ -3689,7 +3734,7 @@
             </a:pPr>
             <a:r>
               <a:rPr/>
-              <a:t>How are data models described?</a:t>
+              <a:t>Steps one and two are interactive</a:t>
             </a:r>
           </a:p>
         </p:txBody>
@@ -3709,24 +3754,15 @@
           <a:bodyPr/>
           <a:lstStyle/>
           <a:p>
-            <a:pPr lvl="0"/>
-            <a:r>
-              <a:rPr/>
-              <a:t>A model is a set of HTML form input types</a:t>
-            </a:r>
-          </a:p>
-          <a:p>
-            <a:pPr lvl="0"/>
-            <a:r>
-              <a:rPr/>
-              <a:t>Expressed using GitHub YAML Issue Template Syntax</a:t>
-            </a:r>
-          </a:p>
-          <a:p>
-            <a:pPr lvl="0"/>
-            <a:r>
-              <a:rPr/>
-              <a:t>Model describes HTML and implies SQL</a:t>
+            <a:pPr lvl="0" indent="0">
+              <a:buNone/>
+            </a:pPr>
+            <a:r>
+              <a:rPr>
+                <a:latin typeface="Courier"/>
+              </a:rPr>
+              <a:t>  newt init app.yaml
+  newt model app.yaml</a:t>
             </a:r>
           </a:p>
         </p:txBody>
@@ -3773,7 +3809,7 @@
             </a:pPr>
             <a:r>
               <a:rPr/>
-              <a:t>How do I think things will work?</a:t>
+              <a:t>Step three, generate our code</a:t>
             </a:r>
           </a:p>
         </p:txBody>
@@ -3793,68 +3829,23 @@
           <a:bodyPr/>
           <a:lstStyle/>
           <a:p>
-            <a:pPr lvl="0" indent="-342900" marL="342900">
-              <a:buAutoNum type="arabicPeriod"/>
+            <a:pPr lvl="0" indent="0">
+              <a:buNone/>
             </a:pPr>
-            <a:r>
-              <a:rPr/>
-              <a:t>Interactively generate our application’s YAML file</a:t>
-            </a:r>
-          </a:p>
-          <a:p>
-            <a:pPr lvl="0" indent="-342900" marL="342900">
-              <a:buAutoNum type="arabicPeriod"/>
-            </a:pPr>
-            <a:r>
-              <a:rPr/>
-              <a:t>Interactively define data models</a:t>
-            </a:r>
-          </a:p>
-          <a:p>
-            <a:pPr lvl="0" indent="-342900" marL="342900">
-              <a:buAutoNum type="arabicPeriod"/>
-            </a:pPr>
-            <a:r>
-              <a:rPr/>
-              <a:t>Generate our application code</a:t>
-            </a:r>
-          </a:p>
-          <a:p>
-            <a:pPr lvl="0" indent="-342900" marL="342900">
-              <a:buAutoNum type="arabicPeriod"/>
-            </a:pPr>
-            <a:r>
-              <a:rPr/>
-              <a:t>Run </a:t>
-            </a:r>
             <a:r>
               <a:rPr>
                 <a:latin typeface="Courier"/>
               </a:rPr>
-              <a:t>newt generate ...</a:t>
-            </a:r>
-            <a:r>
-              <a:rPr/>
-              <a:t> for primary data source</a:t>
-            </a:r>
-          </a:p>
-          <a:p>
-            <a:pPr lvl="0" indent="-342900" marL="342900">
-              <a:buAutoNum type="arabicPeriod"/>
+              <a:t>  newt generate app.yaml</a:t>
+            </a:r>
+          </a:p>
+          <a:p>
+            <a:pPr lvl="0" indent="0" marL="1270000">
+              <a:buNone/>
             </a:pPr>
             <a:r>
-              <a:rPr/>
-              <a:t>Run </a:t>
-            </a:r>
-            <a:r>
-              <a:rPr>
-                <a:latin typeface="Courier"/>
-              </a:rPr>
-              <a:t>newt run ...</a:t>
-            </a:r>
-            <a:r>
-              <a:rPr/>
-              <a:t> to run the application</a:t>
+              <a:rPr sz="2000"/>
+              <a:t>Create a dataset collection and datasetd YAML file Render Handlebars templates Wires up routes Adds tasks to deno.json</a:t>
             </a:r>
           </a:p>
         </p:txBody>
@@ -3901,7 +3892,7 @@
             </a:pPr>
             <a:r>
               <a:rPr/>
-              <a:t>Steps one and two are interactive</a:t>
+              <a:t>Step four, setup primary JSON data source</a:t>
             </a:r>
           </a:p>
         </p:txBody>
@@ -3921,15 +3912,34 @@
           <a:bodyPr/>
           <a:lstStyle/>
           <a:p>
-            <a:pPr lvl="0" indent="0">
+            <a:pPr lvl="0" indent="0" marL="0">
+              <a:spcBef>
+                <a:spcPts val="3000"/>
+              </a:spcBef>
               <a:buNone/>
             </a:pPr>
             <a:r>
-              <a:rPr>
+              <a:rPr b="1"/>
+              <a:t>Dataset collection</a:t>
+            </a:r>
+          </a:p>
+          <a:p>
+            <a:pPr lvl="0" indent="0" marL="1270000">
+              <a:buNone/>
+            </a:pPr>
+            <a:r>
+              <a:rPr sz="2000"/>
+              <a:t>Collection generation is done “auto magically” by </a:t>
+            </a:r>
+            <a:r>
+              <a:rPr sz="2000">
                 <a:latin typeface="Courier"/>
               </a:rPr>
-              <a:t>  newt init app.yaml
-  newt model app.yaml</a:t>
+              <a:t>newt generate app.yaml</a:t>
+            </a:r>
+            <a:r>
+              <a:rPr sz="2000"/>
+              <a:t> datasetd YAML file gets generated so Newt can run the datasetd JSON API</a:t>
             </a:r>
           </a:p>
         </p:txBody>
@@ -3976,7 +3986,7 @@
             </a:pPr>
             <a:r>
               <a:rPr/>
-              <a:t>Step three, generate our code</a:t>
+              <a:t>Step five, run your application and test</a:t>
             </a:r>
           </a:p>
         </p:txBody>
@@ -4003,7 +4013,7 @@
               <a:rPr>
                 <a:latin typeface="Courier"/>
               </a:rPr>
-              <a:t>  newt generate app.yaml</a:t>
+              <a:t>  newt run app.yaml</a:t>
             </a:r>
           </a:p>
           <a:p>
@@ -4012,7 +4022,7 @@
             </a:pPr>
             <a:r>
               <a:rPr sz="2000"/>
-              <a:t>Create a dataset collection and datasetd YAML file Render Handlebars templates Wires up routes Adds tasks to deno.json</a:t>
+              <a:t>Point your web browser at http://localhost:8010 to test</a:t>
             </a:r>
           </a:p>
         </p:txBody>
@@ -4059,7 +4069,7 @@
             </a:pPr>
             <a:r>
               <a:rPr/>
-              <a:t>Step four, setup primary JSON data source</a:t>
+              <a:t>Can I run a demo?</a:t>
             </a:r>
           </a:p>
         </p:txBody>
@@ -4080,33 +4090,11 @@
           <a:lstStyle/>
           <a:p>
             <a:pPr lvl="0" indent="0" marL="0">
-              <a:spcBef>
-                <a:spcPts val="3000"/>
-              </a:spcBef>
               <a:buNone/>
             </a:pPr>
             <a:r>
-              <a:rPr b="1"/>
-              <a:t>Dataset collection</a:t>
-            </a:r>
-          </a:p>
-          <a:p>
-            <a:pPr lvl="0" indent="0" marL="1270000">
-              <a:buNone/>
-            </a:pPr>
-            <a:r>
-              <a:rPr sz="2000"/>
-              <a:t>Collection generation is done “auto magically” by </a:t>
-            </a:r>
-            <a:r>
-              <a:rPr sz="2000">
-                <a:latin typeface="Courier"/>
-              </a:rPr>
-              <a:t>newt generate app.yaml</a:t>
-            </a:r>
-            <a:r>
-              <a:rPr sz="2000"/>
-              <a:t> datasetd YAML file gets generated so Newt can run the datasetd JSON API</a:t>
+              <a:rPr/>
+              <a:t>Not yet, hopefully in early December 2024.</a:t>
             </a:r>
           </a:p>
         </p:txBody>
@@ -4237,7 +4225,7 @@
             </a:pPr>
             <a:r>
               <a:rPr/>
-              <a:t>Step five, run your application and test</a:t>
+              <a:t>Third prototype Status</a:t>
             </a:r>
           </a:p>
         </p:txBody>
@@ -4257,23 +4245,24 @@
           <a:bodyPr/>
           <a:lstStyle/>
           <a:p>
-            <a:pPr lvl="0" indent="0">
-              <a:buNone/>
-            </a:pPr>
-            <a:r>
-              <a:rPr>
-                <a:latin typeface="Courier"/>
-              </a:rPr>
-              <a:t>  newt run app.yaml</a:t>
-            </a:r>
-          </a:p>
-          <a:p>
-            <a:pPr lvl="0" indent="0" marL="1270000">
-              <a:buNone/>
-            </a:pPr>
-            <a:r>
-              <a:rPr sz="2000"/>
-              <a:t>Point your web browser at http://localhost:8010 to test</a:t>
+            <a:pPr lvl="0"/>
+            <a:r>
+              <a:rPr/>
+              <a:t>A work in progress (continuing through 2024)</a:t>
+            </a:r>
+          </a:p>
+          <a:p>
+            <a:pPr lvl="0"/>
+            <a:r>
+              <a:rPr/>
+              <a:t>Working prototype target date June 2025</a:t>
+            </a:r>
+          </a:p>
+          <a:p>
+            <a:pPr lvl="0"/>
+            <a:r>
+              <a:rPr/>
+              <a:t>Using internal applications as test bed</a:t>
             </a:r>
           </a:p>
         </p:txBody>
@@ -4320,7 +4309,7 @@
             </a:pPr>
             <a:r>
               <a:rPr/>
-              <a:t>Can I run a demo?</a:t>
+              <a:t>How much is built?</a:t>
             </a:r>
           </a:p>
         </p:txBody>
@@ -4340,12 +4329,53 @@
           <a:bodyPr/>
           <a:lstStyle/>
           <a:p>
-            <a:pPr lvl="0" indent="0" marL="0">
-              <a:buNone/>
-            </a:pPr>
-            <a:r>
-              <a:rPr/>
-              <a:t>Not yet, hopefully in early December 2024.</a:t>
+            <a:pPr lvl="0"/>
+            <a:r>
+              <a:rPr/>
+              <a:t>☒ Newt developer tool</a:t>
+            </a:r>
+          </a:p>
+          <a:p>
+            <a:pPr lvl="0"/>
+            <a:r>
+              <a:rPr/>
+              <a:t>☒ Router is implemented and working</a:t>
+            </a:r>
+          </a:p>
+          <a:p>
+            <a:pPr lvl="0"/>
+            <a:r>
+              <a:rPr/>
+              <a:t>☒ </a:t>
+            </a:r>
+            <a:r>
+              <a:rPr strike="sngStrike"/>
+              <a:t>Mustache template engine is working</a:t>
+            </a:r>
+            <a:r>
+              <a:rPr/>
+              <a:t> (removed)</a:t>
+            </a:r>
+          </a:p>
+          <a:p>
+            <a:pPr lvl="0"/>
+            <a:r>
+              <a:rPr/>
+              <a:t>☐ Generator development (design stage)</a:t>
+            </a:r>
+          </a:p>
+          <a:p>
+            <a:pPr lvl="0"/>
+            <a:r>
+              <a:rPr/>
+              <a:t>☐ Modeler (design stage)</a:t>
+            </a:r>
+          </a:p>
+          <a:p>
+            <a:pPr lvl="0"/>
+            <a:r>
+              <a:rPr/>
+              <a:t>☐ template engine (design stage)</a:t>
             </a:r>
           </a:p>
         </p:txBody>
@@ -4392,7 +4422,7 @@
             </a:pPr>
             <a:r>
               <a:rPr/>
-              <a:t>Third prototype Status</a:t>
+              <a:t>Insights from prototypes 1 &amp; 2</a:t>
             </a:r>
           </a:p>
         </p:txBody>
@@ -4415,21 +4445,21 @@
             <a:pPr lvl="0"/>
             <a:r>
               <a:rPr/>
-              <a:t>A work in progress (continuing through 2024)</a:t>
-            </a:r>
-          </a:p>
-          <a:p>
-            <a:pPr lvl="0"/>
-            <a:r>
-              <a:rPr/>
-              <a:t>Working prototype target date June 2025</a:t>
-            </a:r>
-          </a:p>
-          <a:p>
-            <a:pPr lvl="0"/>
-            <a:r>
-              <a:rPr/>
-              <a:t>Using internal applications as test bed</a:t>
+              <a:t>“Off the shelf” is simpler</a:t>
+            </a:r>
+          </a:p>
+          <a:p>
+            <a:pPr lvl="0"/>
+            <a:r>
+              <a:rPr/>
+              <a:t>Lots of typing discourages use</a:t>
+            </a:r>
+          </a:p>
+          <a:p>
+            <a:pPr lvl="0"/>
+            <a:r>
+              <a:rPr/>
+              <a:t>Explore conversational coding</a:t>
             </a:r>
           </a:p>
         </p:txBody>
@@ -4476,7 +4506,7 @@
             </a:pPr>
             <a:r>
               <a:rPr/>
-              <a:t>How much is built?</a:t>
+              <a:t>Insights from prototypes 1 &amp; 2</a:t>
             </a:r>
           </a:p>
         </p:txBody>
@@ -4499,50 +4529,28 @@
             <a:pPr lvl="0"/>
             <a:r>
               <a:rPr/>
-              <a:t>☒ Newt developer tool</a:t>
-            </a:r>
-          </a:p>
-          <a:p>
-            <a:pPr lvl="0"/>
-            <a:r>
-              <a:rPr/>
-              <a:t>☒ Router is implemented and working</a:t>
-            </a:r>
-          </a:p>
-          <a:p>
-            <a:pPr lvl="0"/>
-            <a:r>
-              <a:rPr/>
-              <a:t>☒ </a:t>
-            </a:r>
-            <a:r>
-              <a:rPr strike="sngStrike"/>
-              <a:t>Mustache template engine is working</a:t>
-            </a:r>
-            <a:r>
-              <a:rPr/>
-              <a:t> (removed)</a:t>
-            </a:r>
-          </a:p>
-          <a:p>
-            <a:pPr lvl="0"/>
-            <a:r>
-              <a:rPr/>
-              <a:t>☐ Generator development (paused, back to design stage)</a:t>
-            </a:r>
-          </a:p>
-          <a:p>
-            <a:pPr lvl="0"/>
-            <a:r>
-              <a:rPr/>
-              <a:t>☐ Modeler (design stage)</a:t>
-            </a:r>
-          </a:p>
-          <a:p>
-            <a:pPr lvl="0"/>
-            <a:r>
-              <a:rPr/>
-              <a:t>☐ Handlebars template engine (to be generated by Newt)</a:t>
+              <a:t>SQL turns people off, use a code generator</a:t>
+            </a:r>
+          </a:p>
+          <a:p>
+            <a:pPr lvl="0"/>
+            <a:r>
+              <a:rPr/>
+              <a:t>Hand typing templates is a turn off, use a code generator</a:t>
+            </a:r>
+          </a:p>
+          <a:p>
+            <a:pPr lvl="0"/>
+            <a:r>
+              <a:rPr/>
+              <a:t>Large YAML structures benefit from code generation</a:t>
+            </a:r>
+          </a:p>
+          <a:p>
+            <a:pPr lvl="0"/>
+            <a:r>
+              <a:rPr/>
+              <a:t>Automatic “wiring up” of routes and templates very helpful</a:t>
             </a:r>
           </a:p>
         </p:txBody>
@@ -4589,7 +4597,7 @@
             </a:pPr>
             <a:r>
               <a:rPr/>
-              <a:t>Insights from prototypes 1 &amp; 2</a:t>
+              <a:t>What’s next to wrap up prototype 3?</a:t>
             </a:r>
           </a:p>
         </p:txBody>
@@ -4612,14 +4620,28 @@
             <a:pPr lvl="0"/>
             <a:r>
               <a:rPr/>
-              <a:t>“Off the shelf” is simpler</a:t>
-            </a:r>
-          </a:p>
-          <a:p>
-            <a:pPr lvl="0"/>
-            <a:r>
-              <a:rPr/>
-              <a:t>Lots of typing discourages use</a:t>
+              <a:t>Refine and simplify Newt YAML syntax</a:t>
+            </a:r>
+          </a:p>
+          <a:p>
+            <a:pPr lvl="0"/>
+            <a:r>
+              <a:rPr/>
+              <a:t>Refine data router</a:t>
+            </a:r>
+          </a:p>
+          <a:p>
+            <a:pPr lvl="0"/>
+            <a:r>
+              <a:rPr/>
+              <a:t>Retarget, debug and improve the code generator</a:t>
+            </a:r>
+          </a:p>
+          <a:p>
+            <a:pPr lvl="0"/>
+            <a:r>
+              <a:rPr/>
+              <a:t>Design and replace template engine</a:t>
             </a:r>
           </a:p>
         </p:txBody>
@@ -4666,7 +4688,7 @@
             </a:pPr>
             <a:r>
               <a:rPr/>
-              <a:t>Insights from prototypes 1 &amp; 2</a:t>
+              <a:t>Out of the box</a:t>
             </a:r>
           </a:p>
         </p:txBody>
@@ -4688,29 +4710,40 @@
           <a:p>
             <a:pPr lvl="0"/>
             <a:r>
-              <a:rPr/>
-              <a:t>SQL turns people off, use a code generator</a:t>
-            </a:r>
-          </a:p>
-          <a:p>
-            <a:pPr lvl="0"/>
-            <a:r>
-              <a:rPr/>
-              <a:t>Hand typing templates is a turn off, use a code generator</a:t>
-            </a:r>
-          </a:p>
-          <a:p>
-            <a:pPr lvl="0"/>
-            <a:r>
-              <a:rPr/>
-              <a:t>Large YAML structures benefit from code generation</a:t>
-            </a:r>
-          </a:p>
-          <a:p>
-            <a:pPr lvl="0"/>
-            <a:r>
-              <a:rPr/>
-              <a:t>Automatic “wiring up” of routes and templates very helpful</a:t>
+              <a:rPr>
+                <a:latin typeface="Courier"/>
+              </a:rPr>
+              <a:t>newt</a:t>
+            </a:r>
+            <a:r>
+              <a:rPr/>
+              <a:t> the Newt development tool</a:t>
+            </a:r>
+          </a:p>
+          <a:p>
+            <a:pPr lvl="0"/>
+            <a:r>
+              <a:rPr>
+                <a:latin typeface="Courier"/>
+              </a:rPr>
+              <a:t>ndr</a:t>
+            </a:r>
+            <a:r>
+              <a:rPr/>
+              <a:t> the Newt data router</a:t>
+            </a:r>
+          </a:p>
+          <a:p>
+            <a:pPr lvl="0"/>
+            <a:r>
+              <a:rPr>
+                <a:latin typeface="Courier"/>
+              </a:rPr>
+              <a:t>nte</a:t>
+            </a:r>
+            <a:r>
+              <a:rPr/>
+              <a:t> the Newt Template Engine</a:t>
             </a:r>
           </a:p>
         </p:txBody>
@@ -4757,7 +4790,7 @@
             </a:pPr>
             <a:r>
               <a:rPr/>
-              <a:t>What’s next to wrap up prototype 3?</a:t>
+              <a:t>Unanswered Questions</a:t>
             </a:r>
           </a:p>
         </p:txBody>
@@ -4780,21 +4813,14 @@
             <a:pPr lvl="0"/>
             <a:r>
               <a:rPr/>
-              <a:t>Retarget, Debug and improve the code generator</a:t>
-            </a:r>
-          </a:p>
-          <a:p>
-            <a:pPr lvl="0"/>
-            <a:r>
-              <a:rPr/>
-              <a:t>Continue to design and implement a data modeler</a:t>
-            </a:r>
-          </a:p>
-          <a:p>
-            <a:pPr lvl="0"/>
-            <a:r>
-              <a:rPr/>
-              <a:t>Extend Generator to include generating validator and template engine middleware</a:t>
+              <a:t>What is the minimum knowledge required to use Newt effectively?</a:t>
+            </a:r>
+          </a:p>
+          <a:p>
+            <a:pPr lvl="0"/>
+            <a:r>
+              <a:rPr/>
+              <a:t>Who is in the target audience?</a:t>
             </a:r>
           </a:p>
         </p:txBody>
@@ -4841,7 +4867,7 @@
             </a:pPr>
             <a:r>
               <a:rPr/>
-              <a:t>Out of the box</a:t>
+              <a:t>Someday, maybe ideas</a:t>
             </a:r>
           </a:p>
         </p:txBody>
@@ -4864,14 +4890,35 @@
             <a:pPr lvl="0"/>
             <a:r>
               <a:rPr/>
-              <a:t>Newt (development tool)</a:t>
-            </a:r>
-          </a:p>
-          <a:p>
-            <a:pPr lvl="0"/>
-            <a:r>
-              <a:rPr/>
-              <a:t>Newt Router</a:t>
+              <a:t>A visual programming approach could be easier than editing YAML files</a:t>
+            </a:r>
+          </a:p>
+          <a:p>
+            <a:pPr lvl="0"/>
+            <a:r>
+              <a:rPr/>
+              <a:t>Direct SQLite 3 database support and integration</a:t>
+            </a:r>
+          </a:p>
+          <a:p>
+            <a:pPr lvl="0"/>
+            <a:r>
+              <a:rPr/>
+              <a:t>Web components for library, archive and museum metadata types</a:t>
+            </a:r>
+          </a:p>
+          <a:p>
+            <a:pPr lvl="0"/>
+            <a:r>
+              <a:rPr/>
+              <a:t>A S3 protocol web service implementing object storage using OCFL</a:t>
+            </a:r>
+          </a:p>
+          <a:p>
+            <a:pPr lvl="0"/>
+            <a:r>
+              <a:rPr/>
+              <a:t>Generate code which can compile stack into a single binary application</a:t>
             </a:r>
           </a:p>
         </p:txBody>
@@ -4918,7 +4965,7 @@
             </a:pPr>
             <a:r>
               <a:rPr/>
-              <a:t>Unanswered Questions</a:t>
+              <a:t>Related resources</a:t>
             </a:r>
           </a:p>
         </p:txBody>
@@ -4941,14 +4988,39 @@
             <a:pPr lvl="0"/>
             <a:r>
               <a:rPr/>
-              <a:t>What is the minimum knowledge required to use Newt effectively?</a:t>
-            </a:r>
-          </a:p>
-          <a:p>
-            <a:pPr lvl="0"/>
-            <a:r>
-              <a:rPr/>
-              <a:t>Who is in the target audience?</a:t>
+              <a:t>Newt </a:t>
+            </a:r>
+            <a:r>
+              <a:rPr>
+                <a:hlinkClick r:id="rId2"/>
+              </a:rPr>
+              <a:t>https://github.com/caltechlibrary/newt</a:t>
+            </a:r>
+          </a:p>
+          <a:p>
+            <a:pPr lvl="0"/>
+            <a:r>
+              <a:rPr/>
+              <a:t>Dataset + datasetd </a:t>
+            </a:r>
+            <a:r>
+              <a:rPr>
+                <a:hlinkClick r:id="rId3"/>
+              </a:rPr>
+              <a:t>https://github.com/caltechlibrary/dataset</a:t>
+            </a:r>
+          </a:p>
+          <a:p>
+            <a:pPr lvl="0"/>
+            <a:r>
+              <a:rPr>
+                <a:hlinkClick r:id="rId4"/>
+              </a:rPr>
+              <a:t>Handlebars</a:t>
+            </a:r>
+            <a:r>
+              <a:rPr/>
+              <a:t> programming languages support</a:t>
             </a:r>
           </a:p>
         </p:txBody>
@@ -4995,7 +5067,7 @@
             </a:pPr>
             <a:r>
               <a:rPr/>
-              <a:t>Someday, maybe ideas</a:t>
+              <a:t>Thank you!</a:t>
             </a:r>
           </a:p>
         </p:txBody>
@@ -5018,42 +5090,66 @@
             <a:pPr lvl="0"/>
             <a:r>
               <a:rPr/>
-              <a:t>A visual programming approach could be easier than editing YAML files</a:t>
-            </a:r>
-          </a:p>
-          <a:p>
-            <a:pPr lvl="0"/>
-            <a:r>
-              <a:rPr/>
-              <a:t>Direct SQLite 3 database support or integration</a:t>
-            </a:r>
-          </a:p>
-          <a:p>
-            <a:pPr lvl="0"/>
-            <a:r>
-              <a:rPr/>
-              <a:t>A S3 protocol web service implementing object storage using OCFL</a:t>
-            </a:r>
-          </a:p>
-          <a:p>
-            <a:pPr lvl="0"/>
-            <a:r>
-              <a:rPr/>
-              <a:t>Web components for library, archive and museum metadata types</a:t>
-            </a:r>
-          </a:p>
-          <a:p>
-            <a:pPr lvl="0"/>
-            <a:r>
-              <a:rPr/>
-              <a:t>Extend Newt through WASI+WASM run time modules and expose to use in pipelines</a:t>
-            </a:r>
-          </a:p>
-          <a:p>
-            <a:pPr lvl="0"/>
-            <a:r>
-              <a:rPr/>
-              <a:t>WASI+WASM might be useful to conserve ports taken up in the data pipelines</a:t>
+              <a:t>This Presentation</a:t>
+            </a:r>
+          </a:p>
+          <a:p>
+            <a:pPr lvl="1"/>
+            <a:r>
+              <a:rPr/>
+              <a:t>pdf: </a:t>
+            </a:r>
+            <a:r>
+              <a:rPr>
+                <a:hlinkClick r:id="rId2"/>
+              </a:rPr>
+              <a:t>https://caltechlibrary.github.io/newt/presentation3/newt-p3.pdf</a:t>
+            </a:r>
+          </a:p>
+          <a:p>
+            <a:pPr lvl="1"/>
+            <a:r>
+              <a:rPr/>
+              <a:t>pptx: </a:t>
+            </a:r>
+            <a:r>
+              <a:rPr>
+                <a:hlinkClick r:id="rId3"/>
+              </a:rPr>
+              <a:t>https://caltechlibrary.github.io/newt/presentation3/newt-p3.pptx</a:t>
+            </a:r>
+          </a:p>
+          <a:p>
+            <a:pPr lvl="0"/>
+            <a:r>
+              <a:rPr/>
+              <a:t>Newt Documentation </a:t>
+            </a:r>
+            <a:r>
+              <a:rPr>
+                <a:hlinkClick r:id="rId4"/>
+              </a:rPr>
+              <a:t>https://caltechlibrary.github.io/newt</a:t>
+            </a:r>
+          </a:p>
+          <a:p>
+            <a:pPr lvl="0"/>
+            <a:r>
+              <a:rPr/>
+              <a:t>Source Code: </a:t>
+            </a:r>
+            <a:r>
+              <a:rPr>
+                <a:hlinkClick r:id="rId5"/>
+              </a:rPr>
+              <a:t>https://github.com/caltechlibrary/newt</a:t>
+            </a:r>
+          </a:p>
+          <a:p>
+            <a:pPr lvl="0"/>
+            <a:r>
+              <a:rPr/>
+              <a:t>Email: rsdoiel@caltech.edu</a:t>
             </a:r>
           </a:p>
         </p:txBody>
@@ -5152,237 +5248,6 @@
 </p:sld>
 </file>
 
-<file path=ppt/slides/slide30.xml><?xml version="1.0" encoding="utf-8"?>
-<p:sld xmlns:a="http://schemas.openxmlformats.org/drawingml/2006/main" xmlns:r="http://schemas.openxmlformats.org/officeDocument/2006/relationships" xmlns:p="http://schemas.openxmlformats.org/presentationml/2006/main">
-  <p:cSld>
-    <p:spTree>
-      <p:nvGrpSpPr>
-        <p:cNvPr id="1" name=""/>
-        <p:cNvGrpSpPr/>
-        <p:nvPr/>
-      </p:nvGrpSpPr>
-      <p:grpSpPr>
-        <a:xfrm>
-          <a:off x="0" y="0"/>
-          <a:ext cx="0" cy="0"/>
-          <a:chOff x="0" y="0"/>
-          <a:chExt cx="0" cy="0"/>
-        </a:xfrm>
-      </p:grpSpPr>
-      <p:sp>
-        <p:nvSpPr>
-          <p:cNvPr id="2" name="Title 1"/>
-          <p:cNvSpPr>
-            <a:spLocks noGrp="1"/>
-          </p:cNvSpPr>
-          <p:nvPr>
-            <p:ph type="title"/>
-          </p:nvPr>
-        </p:nvSpPr>
-        <p:spPr/>
-        <p:txBody>
-          <a:bodyPr/>
-          <a:lstStyle/>
-          <a:p>
-            <a:pPr lvl="0" indent="0" marL="0">
-              <a:buNone/>
-            </a:pPr>
-            <a:r>
-              <a:rPr/>
-              <a:t>Related resources</a:t>
-            </a:r>
-          </a:p>
-        </p:txBody>
-      </p:sp>
-      <p:sp>
-        <p:nvSpPr>
-          <p:cNvPr id="3" name="Content Placeholder 2"/>
-          <p:cNvSpPr>
-            <a:spLocks noGrp="1"/>
-          </p:cNvSpPr>
-          <p:nvPr>
-            <p:ph idx="1"/>
-          </p:nvPr>
-        </p:nvSpPr>
-        <p:spPr/>
-        <p:txBody>
-          <a:bodyPr/>
-          <a:lstStyle/>
-          <a:p>
-            <a:pPr lvl="0"/>
-            <a:r>
-              <a:rPr/>
-              <a:t>Newt </a:t>
-            </a:r>
-            <a:r>
-              <a:rPr>
-                <a:hlinkClick r:id="rId2"/>
-              </a:rPr>
-              <a:t>https://github.com/caltechlibrary/newt</a:t>
-            </a:r>
-          </a:p>
-          <a:p>
-            <a:pPr lvl="0"/>
-            <a:r>
-              <a:rPr/>
-              <a:t>Dataset + datasetd </a:t>
-            </a:r>
-            <a:r>
-              <a:rPr>
-                <a:hlinkClick r:id="rId3"/>
-              </a:rPr>
-              <a:t>https://github.com/caltechlibrary/dataset</a:t>
-            </a:r>
-          </a:p>
-          <a:p>
-            <a:pPr lvl="0"/>
-            <a:r>
-              <a:rPr>
-                <a:hlinkClick r:id="rId4"/>
-              </a:rPr>
-              <a:t>Handlebars</a:t>
-            </a:r>
-            <a:r>
-              <a:rPr/>
-              <a:t> programming languages support</a:t>
-            </a:r>
-          </a:p>
-        </p:txBody>
-      </p:sp>
-    </p:spTree>
-  </p:cSld>
-</p:sld>
-</file>
-
-<file path=ppt/slides/slide31.xml><?xml version="1.0" encoding="utf-8"?>
-<p:sld xmlns:a="http://schemas.openxmlformats.org/drawingml/2006/main" xmlns:r="http://schemas.openxmlformats.org/officeDocument/2006/relationships" xmlns:p="http://schemas.openxmlformats.org/presentationml/2006/main">
-  <p:cSld>
-    <p:spTree>
-      <p:nvGrpSpPr>
-        <p:cNvPr id="1" name=""/>
-        <p:cNvGrpSpPr/>
-        <p:nvPr/>
-      </p:nvGrpSpPr>
-      <p:grpSpPr>
-        <a:xfrm>
-          <a:off x="0" y="0"/>
-          <a:ext cx="0" cy="0"/>
-          <a:chOff x="0" y="0"/>
-          <a:chExt cx="0" cy="0"/>
-        </a:xfrm>
-      </p:grpSpPr>
-      <p:sp>
-        <p:nvSpPr>
-          <p:cNvPr id="2" name="Title 1"/>
-          <p:cNvSpPr>
-            <a:spLocks noGrp="1"/>
-          </p:cNvSpPr>
-          <p:nvPr>
-            <p:ph type="title"/>
-          </p:nvPr>
-        </p:nvSpPr>
-        <p:spPr/>
-        <p:txBody>
-          <a:bodyPr/>
-          <a:lstStyle/>
-          <a:p>
-            <a:pPr lvl="0" indent="0" marL="0">
-              <a:buNone/>
-            </a:pPr>
-            <a:r>
-              <a:rPr/>
-              <a:t>Thank you!</a:t>
-            </a:r>
-          </a:p>
-        </p:txBody>
-      </p:sp>
-      <p:sp>
-        <p:nvSpPr>
-          <p:cNvPr id="3" name="Content Placeholder 2"/>
-          <p:cNvSpPr>
-            <a:spLocks noGrp="1"/>
-          </p:cNvSpPr>
-          <p:nvPr>
-            <p:ph idx="1"/>
-          </p:nvPr>
-        </p:nvSpPr>
-        <p:spPr/>
-        <p:txBody>
-          <a:bodyPr/>
-          <a:lstStyle/>
-          <a:p>
-            <a:pPr lvl="0"/>
-            <a:r>
-              <a:rPr/>
-              <a:t>This Presentation</a:t>
-            </a:r>
-          </a:p>
-          <a:p>
-            <a:pPr lvl="1"/>
-            <a:r>
-              <a:rPr/>
-              <a:t>pdf: </a:t>
-            </a:r>
-            <a:r>
-              <a:rPr>
-                <a:hlinkClick r:id="rId2"/>
-              </a:rPr>
-              <a:t>https://caltechlibrary.github.io/newt/presentation3/newt-p3.pdf</a:t>
-            </a:r>
-          </a:p>
-          <a:p>
-            <a:pPr lvl="1"/>
-            <a:r>
-              <a:rPr/>
-              <a:t>pptx: </a:t>
-            </a:r>
-            <a:r>
-              <a:rPr>
-                <a:hlinkClick r:id="rId3"/>
-              </a:rPr>
-              <a:t>https://caltechlibrary.github.io/newt/presentation3/newt-p3.pptx</a:t>
-            </a:r>
-          </a:p>
-          <a:p>
-            <a:pPr lvl="0"/>
-            <a:r>
-              <a:rPr/>
-              <a:t>Newt Documentation </a:t>
-            </a:r>
-            <a:r>
-              <a:rPr>
-                <a:hlinkClick r:id="rId4"/>
-              </a:rPr>
-              <a:t>https://caltechlibrary.github.io/newt</a:t>
-            </a:r>
-          </a:p>
-          <a:p>
-            <a:pPr lvl="0"/>
-            <a:r>
-              <a:rPr/>
-              <a:t>Source Code: </a:t>
-            </a:r>
-            <a:r>
-              <a:rPr>
-                <a:hlinkClick r:id="rId5"/>
-              </a:rPr>
-              <a:t>https://github.com/caltechlibrary/newt</a:t>
-            </a:r>
-          </a:p>
-          <a:p>
-            <a:pPr lvl="0"/>
-            <a:r>
-              <a:rPr/>
-              <a:t>Email: rsdoiel@caltech.edu</a:t>
-            </a:r>
-          </a:p>
-        </p:txBody>
-      </p:sp>
-    </p:spTree>
-  </p:cSld>
-</p:sld>
-</file>
-
 <file path=ppt/slides/slide4.xml><?xml version="1.0" encoding="utf-8"?>
 <p:sld xmlns:a="http://schemas.openxmlformats.org/drawingml/2006/main" xmlns:r="http://schemas.openxmlformats.org/officeDocument/2006/relationships" xmlns:p="http://schemas.openxmlformats.org/presentationml/2006/main">
   <p:cSld>
@@ -5736,6 +5601,13 @@
               <a:t>routing requests through data pipelines</a:t>
             </a:r>
           </a:p>
+          <a:p>
+            <a:pPr lvl="0"/>
+            <a:r>
+              <a:rPr/>
+              <a:t>simple template engine renders JSON to HTML</a:t>
+            </a:r>
+          </a:p>
         </p:txBody>
       </p:sp>
     </p:spTree>
@@ -5889,7 +5761,7 @@
             </a:pPr>
             <a:r>
               <a:rPr/>
-              <a:t>What should the default JSON data source be? (dataset+datasetd or Postgres+PostgREST)</a:t>
+              <a:t>What should the default JSON data source be? (dataset+datasetd vs. Postgres+PostgREST)</a:t>
             </a:r>
           </a:p>
           <a:p>
@@ -5898,7 +5770,7 @@
             </a:pPr>
             <a:r>
               <a:rPr/>
-              <a:t>Is generated TypeScript middleware the right fit? (e.g. validation service, template engine)</a:t>
+              <a:t>Is generated TypeScript middleware the right fit? (e.g. validation service)</a:t>
             </a:r>
           </a:p>
           <a:p>
@@ -5908,15 +5780,6 @@
             <a:r>
               <a:rPr/>
               <a:t>Is Handlebars a good fit for managing data views and rendering HTML?</a:t>
-            </a:r>
-          </a:p>
-          <a:p>
-            <a:pPr lvl="0" indent="-342900" marL="342900">
-              <a:buAutoNum type="arabicPeriod"/>
-            </a:pPr>
-            <a:r>
-              <a:rPr/>
-              <a:t>Should the template engine be generic or a generated TypeScript program?</a:t>
             </a:r>
           </a:p>
         </p:txBody>

</xml_diff>

<commit_message>
debugging some YAML encoding weirdness
</commit_message>
<xml_diff>
--- a/presentation3/newt-p3.pptx
+++ b/presentation3/newt-p3.pptx
@@ -33,7 +33,6 @@
     <p:sldId id="281" r:id="rId27"/>
     <p:sldId id="282" r:id="rId28"/>
     <p:sldId id="283" r:id="rId29"/>
-    <p:sldId id="284" r:id="rId30"/>
   </p:sldIdLst>
   <p:sldSz cx="9144000" cy="5143500" type="screen16x9"/>
   <p:notesSz cx="6858000" cy="9144000"/>
@@ -3379,15 +3378,6 @@
             </a:r>
           </a:p>
           <a:p>
-            <a:pPr lvl="1"/>
-            <a:r>
-              <a:rPr>
-                <a:hlinkClick r:id="rId4"/>
-              </a:rPr>
-              <a:t>Dataset + datasetd</a:t>
-            </a:r>
-          </a:p>
-          <a:p>
             <a:pPr lvl="0"/>
             <a:r>
               <a:rPr/>
@@ -3398,7 +3388,7 @@
             <a:pPr lvl="0"/>
             <a:r>
               <a:rPr/>
-              <a:t>Deno to run generated TypeScript middleware</a:t>
+              <a:t>Deno to run generated TypeScript validation middleware</a:t>
             </a:r>
           </a:p>
         </p:txBody>
@@ -3522,7 +3512,7 @@
             </a:pPr>
             <a:r>
               <a:rPr/>
-              <a:t>How are data models described?</a:t>
+              <a:t>How do I think things will work?</a:t>
             </a:r>
           </a:p>
         </p:txBody>
@@ -3542,24 +3532,49 @@
           <a:bodyPr/>
           <a:lstStyle/>
           <a:p>
-            <a:pPr lvl="0"/>
-            <a:r>
-              <a:rPr/>
-              <a:t>A model is a set of HTML form input types</a:t>
-            </a:r>
-          </a:p>
-          <a:p>
-            <a:pPr lvl="0"/>
-            <a:r>
-              <a:rPr/>
-              <a:t>Expressed using GitHub YAML Issue Template Syntax</a:t>
-            </a:r>
-          </a:p>
-          <a:p>
-            <a:pPr lvl="0"/>
-            <a:r>
-              <a:rPr/>
-              <a:t>Model describes HTML and implies SQL</a:t>
+            <a:pPr lvl="0" indent="-342900" marL="342900">
+              <a:buAutoNum type="arabicPeriod"/>
+            </a:pPr>
+            <a:r>
+              <a:rPr/>
+              <a:t>Interactively generate our application’s YAML file (config)</a:t>
+            </a:r>
+          </a:p>
+          <a:p>
+            <a:pPr lvl="0" indent="-342900" marL="342900">
+              <a:buAutoNum type="arabicPeriod"/>
+            </a:pPr>
+            <a:r>
+              <a:rPr/>
+              <a:t>Interactively define data models (model)</a:t>
+            </a:r>
+          </a:p>
+          <a:p>
+            <a:pPr lvl="0" indent="-342900" marL="342900">
+              <a:buAutoNum type="arabicPeriod"/>
+            </a:pPr>
+            <a:r>
+              <a:rPr/>
+              <a:t>Generate our application code (generate)</a:t>
+            </a:r>
+          </a:p>
+          <a:p>
+            <a:pPr lvl="0" indent="-342900" marL="342900">
+              <a:buAutoNum type="arabicPeriod"/>
+            </a:pPr>
+            <a:r>
+              <a:rPr/>
+              <a:t>Run </a:t>
+            </a:r>
+            <a:r>
+              <a:rPr>
+                <a:latin typeface="Courier"/>
+              </a:rPr>
+              <a:t>newt run ...</a:t>
+            </a:r>
+            <a:r>
+              <a:rPr/>
+              <a:t> to run the application</a:t>
             </a:r>
           </a:p>
         </p:txBody>
@@ -3606,7 +3621,7 @@
             </a:pPr>
             <a:r>
               <a:rPr/>
-              <a:t>How do I think things will work?</a:t>
+              <a:t>Steps one and two are interactive</a:t>
             </a:r>
           </a:p>
         </p:txBody>
@@ -3626,68 +3641,15 @@
           <a:bodyPr/>
           <a:lstStyle/>
           <a:p>
-            <a:pPr lvl="0" indent="-342900" marL="342900">
-              <a:buAutoNum type="arabicPeriod"/>
+            <a:pPr lvl="0" indent="0">
+              <a:buNone/>
             </a:pPr>
-            <a:r>
-              <a:rPr/>
-              <a:t>Interactively generate our application’s YAML file</a:t>
-            </a:r>
-          </a:p>
-          <a:p>
-            <a:pPr lvl="0" indent="-342900" marL="342900">
-              <a:buAutoNum type="arabicPeriod"/>
-            </a:pPr>
-            <a:r>
-              <a:rPr/>
-              <a:t>Interactively define data models</a:t>
-            </a:r>
-          </a:p>
-          <a:p>
-            <a:pPr lvl="0" indent="-342900" marL="342900">
-              <a:buAutoNum type="arabicPeriod"/>
-            </a:pPr>
-            <a:r>
-              <a:rPr/>
-              <a:t>Generate our application code</a:t>
-            </a:r>
-          </a:p>
-          <a:p>
-            <a:pPr lvl="0" indent="-342900" marL="342900">
-              <a:buAutoNum type="arabicPeriod"/>
-            </a:pPr>
-            <a:r>
-              <a:rPr/>
-              <a:t>Run </a:t>
-            </a:r>
             <a:r>
               <a:rPr>
                 <a:latin typeface="Courier"/>
               </a:rPr>
-              <a:t>newt generate ...</a:t>
-            </a:r>
-            <a:r>
-              <a:rPr/>
-              <a:t> for primary data source</a:t>
-            </a:r>
-          </a:p>
-          <a:p>
-            <a:pPr lvl="0" indent="-342900" marL="342900">
-              <a:buAutoNum type="arabicPeriod"/>
-            </a:pPr>
-            <a:r>
-              <a:rPr/>
-              <a:t>Run </a:t>
-            </a:r>
-            <a:r>
-              <a:rPr>
-                <a:latin typeface="Courier"/>
-              </a:rPr>
-              <a:t>newt run ...</a:t>
-            </a:r>
-            <a:r>
-              <a:rPr/>
-              <a:t> to run the application</a:t>
+              <a:t>  newt config app.yaml
+  newt model app.yaml</a:t>
             </a:r>
           </a:p>
         </p:txBody>
@@ -3734,7 +3696,7 @@
             </a:pPr>
             <a:r>
               <a:rPr/>
-              <a:t>Steps one and two are interactive</a:t>
+              <a:t>Step three, generate our code</a:t>
             </a:r>
           </a:p>
         </p:txBody>
@@ -3761,8 +3723,16 @@
               <a:rPr>
                 <a:latin typeface="Courier"/>
               </a:rPr>
-              <a:t>  newt config app.yaml
-  newt model app.yaml</a:t>
+              <a:t>  newt generate app.yaml</a:t>
+            </a:r>
+          </a:p>
+          <a:p>
+            <a:pPr lvl="0" indent="0" marL="1270000">
+              <a:buNone/>
+            </a:pPr>
+            <a:r>
+              <a:rPr sz="2000"/>
+              <a:t>Create Postgres+PostgREST setup and schema (e.g. SQL files) Generate Handlebars templates Creates a TypeScript model validation service Wires up routes and template mappings</a:t>
             </a:r>
           </a:p>
         </p:txBody>
@@ -3809,7 +3779,7 @@
             </a:pPr>
             <a:r>
               <a:rPr/>
-              <a:t>Step three, generate our code</a:t>
+              <a:t>Step four, setup primary JSON data source</a:t>
             </a:r>
           </a:p>
         </p:txBody>
@@ -3829,23 +3799,44 @@
           <a:bodyPr/>
           <a:lstStyle/>
           <a:p>
-            <a:pPr lvl="0" indent="0">
+            <a:pPr lvl="0" indent="0" marL="0">
+              <a:spcBef>
+                <a:spcPts val="3000"/>
+              </a:spcBef>
               <a:buNone/>
             </a:pPr>
             <a:r>
-              <a:rPr>
+              <a:rPr b="1"/>
+              <a:t>JSON data source</a:t>
+            </a:r>
+          </a:p>
+          <a:p>
+            <a:pPr lvl="0" indent="0" marL="1270000">
+              <a:buNone/>
+            </a:pPr>
+            <a:r>
+              <a:rPr sz="2000"/>
+              <a:t>Load the SQL in to Postgres via </a:t>
+            </a:r>
+            <a:r>
+              <a:rPr sz="2000">
                 <a:latin typeface="Courier"/>
               </a:rPr>
-              <a:t>  newt generate app.yaml</a:t>
-            </a:r>
-          </a:p>
-          <a:p>
-            <a:pPr lvl="0" indent="0" marL="1270000">
-              <a:buNone/>
-            </a:pPr>
+              <a:t>psql</a:t>
+            </a:r>
             <a:r>
               <a:rPr sz="2000"/>
-              <a:t>Create a dataset collection and datasetd YAML file Generate Handlebars templates Wires up routes and template mappings</a:t>
+              <a:t> Run PostgREST via </a:t>
+            </a:r>
+            <a:r>
+              <a:rPr sz="2000">
+                <a:latin typeface="Courier"/>
+              </a:rPr>
+              <a:t>newt run</a:t>
+            </a:r>
+            <a:r>
+              <a:rPr sz="2000"/>
+              <a:t> …</a:t>
             </a:r>
           </a:p>
         </p:txBody>
@@ -3892,7 +3883,7 @@
             </a:pPr>
             <a:r>
               <a:rPr/>
-              <a:t>Step four, setup primary JSON data source</a:t>
+              <a:t>Step five, run your application and test</a:t>
             </a:r>
           </a:p>
         </p:txBody>
@@ -3912,34 +3903,23 @@
           <a:bodyPr/>
           <a:lstStyle/>
           <a:p>
-            <a:pPr lvl="0" indent="0" marL="0">
-              <a:spcBef>
-                <a:spcPts val="3000"/>
-              </a:spcBef>
+            <a:pPr lvl="0" indent="0">
               <a:buNone/>
             </a:pPr>
             <a:r>
-              <a:rPr b="1"/>
-              <a:t>Dataset collection</a:t>
-            </a:r>
-          </a:p>
-          <a:p>
-            <a:pPr lvl="0" indent="0" marL="1270000">
-              <a:buNone/>
-            </a:pPr>
-            <a:r>
-              <a:rPr sz="2000"/>
-              <a:t>Collection generation is done “auto magically” by </a:t>
-            </a:r>
-            <a:r>
-              <a:rPr sz="2000">
+              <a:rPr>
                 <a:latin typeface="Courier"/>
               </a:rPr>
-              <a:t>newt generate app.yaml</a:t>
-            </a:r>
+              <a:t>  newt run app.yaml</a:t>
+            </a:r>
+          </a:p>
+          <a:p>
+            <a:pPr lvl="0" indent="0" marL="1270000">
+              <a:buNone/>
+            </a:pPr>
             <a:r>
               <a:rPr sz="2000"/>
-              <a:t> datasetd YAML file gets generated so Newt can run the datasetd JSON API</a:t>
+              <a:t>Point your web browser at http://localhost:8010 to test</a:t>
             </a:r>
           </a:p>
         </p:txBody>
@@ -3986,7 +3966,7 @@
             </a:pPr>
             <a:r>
               <a:rPr/>
-              <a:t>Step five, run your application and test</a:t>
+              <a:t>Here’s an ASCII type demo of the system</a:t>
             </a:r>
           </a:p>
         </p:txBody>
@@ -4006,23 +3986,12 @@
           <a:bodyPr/>
           <a:lstStyle/>
           <a:p>
-            <a:pPr lvl="0" indent="0">
+            <a:pPr lvl="0" indent="0" marL="0">
               <a:buNone/>
             </a:pPr>
             <a:r>
-              <a:rPr>
-                <a:latin typeface="Courier"/>
-              </a:rPr>
-              <a:t>  newt run app.yaml</a:t>
-            </a:r>
-          </a:p>
-          <a:p>
-            <a:pPr lvl="0" indent="0" marL="1270000">
-              <a:buNone/>
-            </a:pPr>
-            <a:r>
-              <a:rPr sz="2000"/>
-              <a:t>Point your web browser at http://localhost:8010 to test</a:t>
+              <a:rPr/>
+              <a:t>FIXME: to be created and linked to after validation service generation completed</a:t>
             </a:r>
           </a:p>
         </p:txBody>
@@ -4069,7 +4038,7 @@
             </a:pPr>
             <a:r>
               <a:rPr/>
-              <a:t>Can I run a demo?</a:t>
+              <a:t>Third prototype Status</a:t>
             </a:r>
           </a:p>
         </p:txBody>
@@ -4089,12 +4058,24 @@
           <a:bodyPr/>
           <a:lstStyle/>
           <a:p>
-            <a:pPr lvl="0" indent="0" marL="0">
-              <a:buNone/>
-            </a:pPr>
-            <a:r>
-              <a:rPr/>
-              <a:t>Not yet, hopefully in early December 2024.</a:t>
+            <a:pPr lvl="0"/>
+            <a:r>
+              <a:rPr/>
+              <a:t>A work in progress (continuing through 2024)</a:t>
+            </a:r>
+          </a:p>
+          <a:p>
+            <a:pPr lvl="0"/>
+            <a:r>
+              <a:rPr/>
+              <a:t>A Working version 1.0 hopefully in 2025</a:t>
+            </a:r>
+          </a:p>
+          <a:p>
+            <a:pPr lvl="0"/>
+            <a:r>
+              <a:rPr/>
+              <a:t>Using internal applications as test bed</a:t>
             </a:r>
           </a:p>
         </p:txBody>
@@ -4225,7 +4206,7 @@
             </a:pPr>
             <a:r>
               <a:rPr/>
-              <a:t>Third prototype Status</a:t>
+              <a:t>How much is built?</a:t>
             </a:r>
           </a:p>
         </p:txBody>
@@ -4248,21 +4229,50 @@
             <a:pPr lvl="0"/>
             <a:r>
               <a:rPr/>
-              <a:t>A work in progress (continuing through 2024)</a:t>
-            </a:r>
-          </a:p>
-          <a:p>
-            <a:pPr lvl="0"/>
-            <a:r>
-              <a:rPr/>
-              <a:t>Working prototype target date June 2025</a:t>
-            </a:r>
-          </a:p>
-          <a:p>
-            <a:pPr lvl="0"/>
-            <a:r>
-              <a:rPr/>
-              <a:t>Using internal applications as test bed</a:t>
+              <a:t>☒ Newt developer tool</a:t>
+            </a:r>
+          </a:p>
+          <a:p>
+            <a:pPr lvl="0"/>
+            <a:r>
+              <a:rPr/>
+              <a:t>☒ Router is implemented and working</a:t>
+            </a:r>
+          </a:p>
+          <a:p>
+            <a:pPr lvl="0"/>
+            <a:r>
+              <a:rPr/>
+              <a:t>☒ </a:t>
+            </a:r>
+            <a:r>
+              <a:rPr strike="sngStrike"/>
+              <a:t>Mustache template engine is working</a:t>
+            </a:r>
+            <a:r>
+              <a:rPr/>
+              <a:t> (removed)</a:t>
+            </a:r>
+          </a:p>
+          <a:p>
+            <a:pPr lvl="0"/>
+            <a:r>
+              <a:rPr/>
+              <a:t>☒ Newt template engine (supporting Handlebars templates)</a:t>
+            </a:r>
+          </a:p>
+          <a:p>
+            <a:pPr lvl="0"/>
+            <a:r>
+              <a:rPr/>
+              <a:t>☒ Modeler (testing and refinement)</a:t>
+            </a:r>
+          </a:p>
+          <a:p>
+            <a:pPr lvl="0"/>
+            <a:r>
+              <a:rPr/>
+              <a:t>☐ Generator development (refactor, testing and refinement)</a:t>
             </a:r>
           </a:p>
         </p:txBody>
@@ -4309,7 +4319,7 @@
             </a:pPr>
             <a:r>
               <a:rPr/>
-              <a:t>How much is built?</a:t>
+              <a:t>Insights from prototypes 1, 2 &amp; 3</a:t>
             </a:r>
           </a:p>
         </p:txBody>
@@ -4332,50 +4342,21 @@
             <a:pPr lvl="0"/>
             <a:r>
               <a:rPr/>
-              <a:t>☒ Newt developer tool</a:t>
-            </a:r>
-          </a:p>
-          <a:p>
-            <a:pPr lvl="0"/>
-            <a:r>
-              <a:rPr/>
-              <a:t>☒ Router is implemented and working</a:t>
-            </a:r>
-          </a:p>
-          <a:p>
-            <a:pPr lvl="0"/>
-            <a:r>
-              <a:rPr/>
-              <a:t>☒ </a:t>
-            </a:r>
-            <a:r>
-              <a:rPr strike="sngStrike"/>
-              <a:t>Mustache template engine is working</a:t>
-            </a:r>
-            <a:r>
-              <a:rPr/>
-              <a:t> (removed)</a:t>
-            </a:r>
-          </a:p>
-          <a:p>
-            <a:pPr lvl="0"/>
-            <a:r>
-              <a:rPr/>
-              <a:t>☒ Newt template engine (supporting Handlebars templates)</a:t>
-            </a:r>
-          </a:p>
-          <a:p>
-            <a:pPr lvl="0"/>
-            <a:r>
-              <a:rPr/>
-              <a:t>☐ Modeler (design stage)</a:t>
-            </a:r>
-          </a:p>
-          <a:p>
-            <a:pPr lvl="0"/>
-            <a:r>
-              <a:rPr/>
-              <a:t>☐ Generator development (refactor, design stage)</a:t>
+              <a:t>“Off the shelf” is simpler</a:t>
+            </a:r>
+          </a:p>
+          <a:p>
+            <a:pPr lvl="0"/>
+            <a:r>
+              <a:rPr/>
+              <a:t>A Validition service in TypeScript lets us leverage the same generated code in the browser</a:t>
+            </a:r>
+          </a:p>
+          <a:p>
+            <a:pPr lvl="0"/>
+            <a:r>
+              <a:rPr/>
+              <a:t>A conversational UI looks promising (needs allot of refinement)</a:t>
             </a:r>
           </a:p>
         </p:txBody>
@@ -4445,21 +4426,28 @@
             <a:pPr lvl="0"/>
             <a:r>
               <a:rPr/>
-              <a:t>“Off the shelf” is simpler</a:t>
-            </a:r>
-          </a:p>
-          <a:p>
-            <a:pPr lvl="0"/>
-            <a:r>
-              <a:rPr/>
-              <a:t>Lots of typing discourages use</a:t>
-            </a:r>
-          </a:p>
-          <a:p>
-            <a:pPr lvl="0"/>
-            <a:r>
-              <a:rPr/>
-              <a:t>Explore conversational coding</a:t>
+              <a:t>SQL turns people off, use a code generator</a:t>
+            </a:r>
+          </a:p>
+          <a:p>
+            <a:pPr lvl="0"/>
+            <a:r>
+              <a:rPr/>
+              <a:t>Hand typing templates is a turn off, use a code generator</a:t>
+            </a:r>
+          </a:p>
+          <a:p>
+            <a:pPr lvl="0"/>
+            <a:r>
+              <a:rPr/>
+              <a:t>Large YAML structures benefit from code generation</a:t>
+            </a:r>
+          </a:p>
+          <a:p>
+            <a:pPr lvl="0"/>
+            <a:r>
+              <a:rPr/>
+              <a:t>Automatic “wiring up” of routes and templates very helpful</a:t>
             </a:r>
           </a:p>
         </p:txBody>
@@ -4506,7 +4494,7 @@
             </a:pPr>
             <a:r>
               <a:rPr/>
-              <a:t>Insights from prototypes 1 &amp; 2</a:t>
+              <a:t>What’s next to wrap up prototype 4?</a:t>
             </a:r>
           </a:p>
         </p:txBody>
@@ -4529,28 +4517,28 @@
             <a:pPr lvl="0"/>
             <a:r>
               <a:rPr/>
-              <a:t>SQL turns people off, use a code generator</a:t>
-            </a:r>
-          </a:p>
-          <a:p>
-            <a:pPr lvl="0"/>
-            <a:r>
-              <a:rPr/>
-              <a:t>Hand typing templates is a turn off, use a code generator</a:t>
-            </a:r>
-          </a:p>
-          <a:p>
-            <a:pPr lvl="0"/>
-            <a:r>
-              <a:rPr/>
-              <a:t>Large YAML structures benefit from code generation</a:t>
-            </a:r>
-          </a:p>
-          <a:p>
-            <a:pPr lvl="0"/>
-            <a:r>
-              <a:rPr/>
-              <a:t>Automatic “wiring up” of routes and templates very helpful</a:t>
+              <a:t>Refine template engine</a:t>
+            </a:r>
+          </a:p>
+          <a:p>
+            <a:pPr lvl="0"/>
+            <a:r>
+              <a:rPr/>
+              <a:t>Refine Newt YAML syntax</a:t>
+            </a:r>
+          </a:p>
+          <a:p>
+            <a:pPr lvl="0"/>
+            <a:r>
+              <a:rPr/>
+              <a:t>Refine data router</a:t>
+            </a:r>
+          </a:p>
+          <a:p>
+            <a:pPr lvl="0"/>
+            <a:r>
+              <a:rPr/>
+              <a:t>Retarget, debug and improve the code generator</a:t>
             </a:r>
           </a:p>
         </p:txBody>
@@ -4597,7 +4585,7 @@
             </a:pPr>
             <a:r>
               <a:rPr/>
-              <a:t>What’s next to wrap up prototype 3?</a:t>
+              <a:t>Out of the box</a:t>
             </a:r>
           </a:p>
         </p:txBody>
@@ -4619,29 +4607,40 @@
           <a:p>
             <a:pPr lvl="0"/>
             <a:r>
-              <a:rPr/>
-              <a:t>Refine and simplify Newt YAML syntax</a:t>
-            </a:r>
-          </a:p>
-          <a:p>
-            <a:pPr lvl="0"/>
-            <a:r>
-              <a:rPr/>
-              <a:t>Refine data router</a:t>
-            </a:r>
-          </a:p>
-          <a:p>
-            <a:pPr lvl="0"/>
-            <a:r>
-              <a:rPr/>
-              <a:t>Retarget, debug and improve the code generator</a:t>
-            </a:r>
-          </a:p>
-          <a:p>
-            <a:pPr lvl="0"/>
-            <a:r>
-              <a:rPr/>
-              <a:t>Design and replace template engine</a:t>
+              <a:rPr>
+                <a:latin typeface="Courier"/>
+              </a:rPr>
+              <a:t>newt</a:t>
+            </a:r>
+            <a:r>
+              <a:rPr/>
+              <a:t> the Newt development tool</a:t>
+            </a:r>
+          </a:p>
+          <a:p>
+            <a:pPr lvl="0"/>
+            <a:r>
+              <a:rPr>
+                <a:latin typeface="Courier"/>
+              </a:rPr>
+              <a:t>ndr</a:t>
+            </a:r>
+            <a:r>
+              <a:rPr/>
+              <a:t> the Newt data router</a:t>
+            </a:r>
+          </a:p>
+          <a:p>
+            <a:pPr lvl="0"/>
+            <a:r>
+              <a:rPr>
+                <a:latin typeface="Courier"/>
+              </a:rPr>
+              <a:t>nte</a:t>
+            </a:r>
+            <a:r>
+              <a:rPr/>
+              <a:t> the Newt Template Engine</a:t>
             </a:r>
           </a:p>
         </p:txBody>
@@ -4688,7 +4687,7 @@
             </a:pPr>
             <a:r>
               <a:rPr/>
-              <a:t>Out of the box</a:t>
+              <a:t>Unanswered Questions</a:t>
             </a:r>
           </a:p>
         </p:txBody>
@@ -4710,40 +4709,22 @@
           <a:p>
             <a:pPr lvl="0"/>
             <a:r>
-              <a:rPr>
-                <a:latin typeface="Courier"/>
-              </a:rPr>
-              <a:t>newt</a:t>
-            </a:r>
-            <a:r>
-              <a:rPr/>
-              <a:t> the Newt development tool</a:t>
-            </a:r>
-          </a:p>
-          <a:p>
-            <a:pPr lvl="0"/>
-            <a:r>
-              <a:rPr>
-                <a:latin typeface="Courier"/>
-              </a:rPr>
-              <a:t>ndr</a:t>
-            </a:r>
-            <a:r>
-              <a:rPr/>
-              <a:t> the Newt data router</a:t>
-            </a:r>
-          </a:p>
-          <a:p>
-            <a:pPr lvl="0"/>
-            <a:r>
-              <a:rPr>
-                <a:latin typeface="Courier"/>
-              </a:rPr>
-              <a:t>nte</a:t>
-            </a:r>
-            <a:r>
-              <a:rPr/>
-              <a:t> the Newt Template Engine</a:t>
+              <a:rPr/>
+              <a:t>What is the minimum knowledge required to use Newt effectively?</a:t>
+            </a:r>
+          </a:p>
+          <a:p>
+            <a:pPr lvl="0"/>
+            <a:r>
+              <a:rPr/>
+              <a:t>Who is in the target audience?</a:t>
+            </a:r>
+          </a:p>
+          <a:p>
+            <a:pPr lvl="0"/>
+            <a:r>
+              <a:rPr/>
+              <a:t>Would a visual programming approach make more sense then a conversational UI?</a:t>
             </a:r>
           </a:p>
         </p:txBody>
@@ -4790,7 +4771,7 @@
             </a:pPr>
             <a:r>
               <a:rPr/>
-              <a:t>Unanswered Questions</a:t>
+              <a:t>Someday, maybe ideas</a:t>
             </a:r>
           </a:p>
         </p:txBody>
@@ -4813,14 +4794,35 @@
             <a:pPr lvl="0"/>
             <a:r>
               <a:rPr/>
-              <a:t>What is the minimum knowledge required to use Newt effectively?</a:t>
-            </a:r>
-          </a:p>
-          <a:p>
-            <a:pPr lvl="0"/>
-            <a:r>
-              <a:rPr/>
-              <a:t>Who is in the target audience?</a:t>
+              <a:t>A visual programming approach could be easier than editing YAML files</a:t>
+            </a:r>
+          </a:p>
+          <a:p>
+            <a:pPr lvl="0"/>
+            <a:r>
+              <a:rPr/>
+              <a:t>Direct SQLite 3 database support and integration could be much simpler than Postgres+PostgREST</a:t>
+            </a:r>
+          </a:p>
+          <a:p>
+            <a:pPr lvl="0"/>
+            <a:r>
+              <a:rPr/>
+              <a:t>Web components for library, archive and museum metadata types</a:t>
+            </a:r>
+          </a:p>
+          <a:p>
+            <a:pPr lvl="0"/>
+            <a:r>
+              <a:rPr/>
+              <a:t>A S3 protocol web service implementing object storage using OCFL</a:t>
+            </a:r>
+          </a:p>
+          <a:p>
+            <a:pPr lvl="0"/>
+            <a:r>
+              <a:rPr/>
+              <a:t>Generate code which can compile stack into a single binary application</a:t>
             </a:r>
           </a:p>
         </p:txBody>
@@ -4867,7 +4869,7 @@
             </a:pPr>
             <a:r>
               <a:rPr/>
-              <a:t>Someday, maybe ideas</a:t>
+              <a:t>Related resources</a:t>
             </a:r>
           </a:p>
         </p:txBody>
@@ -4890,35 +4892,39 @@
             <a:pPr lvl="0"/>
             <a:r>
               <a:rPr/>
-              <a:t>A visual programming approach could be easier than editing YAML files</a:t>
-            </a:r>
-          </a:p>
-          <a:p>
-            <a:pPr lvl="0"/>
-            <a:r>
-              <a:rPr/>
-              <a:t>Direct SQLite 3 database support and integration</a:t>
-            </a:r>
-          </a:p>
-          <a:p>
-            <a:pPr lvl="0"/>
-            <a:r>
-              <a:rPr/>
-              <a:t>Web components for library, archive and museum metadata types</a:t>
-            </a:r>
-          </a:p>
-          <a:p>
-            <a:pPr lvl="0"/>
-            <a:r>
-              <a:rPr/>
-              <a:t>A S3 protocol web service implementing object storage using OCFL</a:t>
-            </a:r>
-          </a:p>
-          <a:p>
-            <a:pPr lvl="0"/>
-            <a:r>
-              <a:rPr/>
-              <a:t>Generate code which can compile stack into a single binary application</a:t>
+              <a:t>Newt </a:t>
+            </a:r>
+            <a:r>
+              <a:rPr>
+                <a:hlinkClick r:id="rId2"/>
+              </a:rPr>
+              <a:t>https://github.com/caltechlibrary/newt</a:t>
+            </a:r>
+          </a:p>
+          <a:p>
+            <a:pPr lvl="0"/>
+            <a:r>
+              <a:rPr/>
+              <a:t>Dataset + datasetd </a:t>
+            </a:r>
+            <a:r>
+              <a:rPr>
+                <a:hlinkClick r:id="rId3"/>
+              </a:rPr>
+              <a:t>https://github.com/caltechlibrary/dataset</a:t>
+            </a:r>
+          </a:p>
+          <a:p>
+            <a:pPr lvl="0"/>
+            <a:r>
+              <a:rPr>
+                <a:hlinkClick r:id="rId4"/>
+              </a:rPr>
+              <a:t>Handlebars</a:t>
+            </a:r>
+            <a:r>
+              <a:rPr/>
+              <a:t> programming languages support</a:t>
             </a:r>
           </a:p>
         </p:txBody>
@@ -4965,108 +4971,6 @@
             </a:pPr>
             <a:r>
               <a:rPr/>
-              <a:t>Related resources</a:t>
-            </a:r>
-          </a:p>
-        </p:txBody>
-      </p:sp>
-      <p:sp>
-        <p:nvSpPr>
-          <p:cNvPr id="3" name="Content Placeholder 2"/>
-          <p:cNvSpPr>
-            <a:spLocks noGrp="1"/>
-          </p:cNvSpPr>
-          <p:nvPr>
-            <p:ph idx="1"/>
-          </p:nvPr>
-        </p:nvSpPr>
-        <p:spPr/>
-        <p:txBody>
-          <a:bodyPr/>
-          <a:lstStyle/>
-          <a:p>
-            <a:pPr lvl="0"/>
-            <a:r>
-              <a:rPr/>
-              <a:t>Newt </a:t>
-            </a:r>
-            <a:r>
-              <a:rPr>
-                <a:hlinkClick r:id="rId2"/>
-              </a:rPr>
-              <a:t>https://github.com/caltechlibrary/newt</a:t>
-            </a:r>
-          </a:p>
-          <a:p>
-            <a:pPr lvl="0"/>
-            <a:r>
-              <a:rPr/>
-              <a:t>Dataset + datasetd </a:t>
-            </a:r>
-            <a:r>
-              <a:rPr>
-                <a:hlinkClick r:id="rId3"/>
-              </a:rPr>
-              <a:t>https://github.com/caltechlibrary/dataset</a:t>
-            </a:r>
-          </a:p>
-          <a:p>
-            <a:pPr lvl="0"/>
-            <a:r>
-              <a:rPr>
-                <a:hlinkClick r:id="rId4"/>
-              </a:rPr>
-              <a:t>Handlebars</a:t>
-            </a:r>
-            <a:r>
-              <a:rPr/>
-              <a:t> programming languages support</a:t>
-            </a:r>
-          </a:p>
-        </p:txBody>
-      </p:sp>
-    </p:spTree>
-  </p:cSld>
-</p:sld>
-</file>
-
-<file path=ppt/slides/slide29.xml><?xml version="1.0" encoding="utf-8"?>
-<p:sld xmlns:a="http://schemas.openxmlformats.org/drawingml/2006/main" xmlns:r="http://schemas.openxmlformats.org/officeDocument/2006/relationships" xmlns:p="http://schemas.openxmlformats.org/presentationml/2006/main">
-  <p:cSld>
-    <p:spTree>
-      <p:nvGrpSpPr>
-        <p:cNvPr id="1" name=""/>
-        <p:cNvGrpSpPr/>
-        <p:nvPr/>
-      </p:nvGrpSpPr>
-      <p:grpSpPr>
-        <a:xfrm>
-          <a:off x="0" y="0"/>
-          <a:ext cx="0" cy="0"/>
-          <a:chOff x="0" y="0"/>
-          <a:chExt cx="0" cy="0"/>
-        </a:xfrm>
-      </p:grpSpPr>
-      <p:sp>
-        <p:nvSpPr>
-          <p:cNvPr id="2" name="Title 1"/>
-          <p:cNvSpPr>
-            <a:spLocks noGrp="1"/>
-          </p:cNvSpPr>
-          <p:nvPr>
-            <p:ph type="title"/>
-          </p:nvPr>
-        </p:nvSpPr>
-        <p:spPr/>
-        <p:txBody>
-          <a:bodyPr/>
-          <a:lstStyle/>
-          <a:p>
-            <a:pPr lvl="0" indent="0" marL="0">
-              <a:buNone/>
-            </a:pPr>
-            <a:r>
-              <a:rPr/>
               <a:t>Thank you!</a:t>
             </a:r>
           </a:p>
@@ -5346,7 +5250,7 @@
             </a:pPr>
             <a:r>
               <a:rPr/>
-              <a:t>Managing the YAML file can be done conversationally</a:t>
+              <a:t>Managing the YAML file should be done conversationally</a:t>
             </a:r>
           </a:p>
         </p:txBody>
@@ -5761,39 +5665,25 @@
             </a:pPr>
             <a:r>
               <a:rPr/>
-              <a:t>What should the default JSON data source be?</a:t>
-            </a:r>
-          </a:p>
-          <a:p>
-            <a:pPr lvl="0"/>
-            <a:r>
-              <a:rPr/>
-              <a:t>continue with Postgres+PostgREST or simplify with Dataset+datasetd?</a:t>
+              <a:t>Is generated TypeScript middleware the right fit for a validation service?</a:t>
             </a:r>
           </a:p>
           <a:p>
             <a:pPr lvl="0" indent="-342900" marL="342900">
-              <a:buAutoNum startAt="2" type="arabicPeriod"/>
+              <a:buAutoNum type="arabicPeriod"/>
             </a:pPr>
             <a:r>
               <a:rPr/>
-              <a:t>Is generated TypeScript middleware the right fit?</a:t>
-            </a:r>
-          </a:p>
-          <a:p>
-            <a:pPr lvl="0"/>
-            <a:r>
-              <a:rPr/>
-              <a:t>E.g. as a validation service, is Deno a reasonable dependency?</a:t>
+              <a:t>Is Handlebars a good fit for managing data views and rendering HTML?</a:t>
             </a:r>
           </a:p>
           <a:p>
             <a:pPr lvl="0" indent="-342900" marL="342900">
-              <a:buAutoNum startAt="3" type="arabicPeriod"/>
+              <a:buAutoNum type="arabicPeriod"/>
             </a:pPr>
             <a:r>
               <a:rPr/>
-              <a:t>Is Handlebars a good fit for managing data views and rendering HTML?</a:t>
+              <a:t>Is Postgres+PostgREST the right JSON data source to focus on?</a:t>
             </a:r>
           </a:p>
         </p:txBody>

</xml_diff>